<commit_message>
add some nice graphs...
</commit_message>
<xml_diff>
--- a/classes/stats2018/Lecture17.pptx
+++ b/classes/stats2018/Lecture17.pptx
@@ -5,7 +5,7 @@
     <p:sldMasterId id="2147483648" r:id="rId1"/>
   </p:sldMasterIdLst>
   <p:notesMasterIdLst>
-    <p:notesMasterId r:id="rId67"/>
+    <p:notesMasterId r:id="rId71"/>
   </p:notesMasterIdLst>
   <p:sldIdLst>
     <p:sldId id="326" r:id="rId2"/>
@@ -61,18 +61,22 @@
     <p:sldId id="295" r:id="rId52"/>
     <p:sldId id="324" r:id="rId53"/>
     <p:sldId id="296" r:id="rId54"/>
-    <p:sldId id="297" r:id="rId55"/>
-    <p:sldId id="298" r:id="rId56"/>
-    <p:sldId id="301" r:id="rId57"/>
-    <p:sldId id="302" r:id="rId58"/>
-    <p:sldId id="303" r:id="rId59"/>
-    <p:sldId id="304" r:id="rId60"/>
-    <p:sldId id="305" r:id="rId61"/>
-    <p:sldId id="306" r:id="rId62"/>
-    <p:sldId id="307" r:id="rId63"/>
-    <p:sldId id="308" r:id="rId64"/>
-    <p:sldId id="309" r:id="rId65"/>
-    <p:sldId id="310" r:id="rId66"/>
+    <p:sldId id="327" r:id="rId55"/>
+    <p:sldId id="328" r:id="rId56"/>
+    <p:sldId id="329" r:id="rId57"/>
+    <p:sldId id="330" r:id="rId58"/>
+    <p:sldId id="297" r:id="rId59"/>
+    <p:sldId id="298" r:id="rId60"/>
+    <p:sldId id="301" r:id="rId61"/>
+    <p:sldId id="302" r:id="rId62"/>
+    <p:sldId id="303" r:id="rId63"/>
+    <p:sldId id="304" r:id="rId64"/>
+    <p:sldId id="305" r:id="rId65"/>
+    <p:sldId id="306" r:id="rId66"/>
+    <p:sldId id="307" r:id="rId67"/>
+    <p:sldId id="308" r:id="rId68"/>
+    <p:sldId id="309" r:id="rId69"/>
+    <p:sldId id="310" r:id="rId70"/>
   </p:sldIdLst>
   <p:sldSz cx="9144000" cy="6858000" type="screen4x3"/>
   <p:notesSz cx="6858000" cy="9144000"/>
@@ -273,7 +277,7 @@
             <a:fld id="{04CF0F85-68D0-4C9E-9C3D-C3BA0419FD92}" type="datetimeFigureOut">
               <a:rPr lang="en-US" smtClean="0"/>
               <a:pPr/>
-              <a:t>4/3/2018</a:t>
+              <a:t>4/5/2018</a:t>
             </a:fld>
             <a:endParaRPr lang="en-US"/>
           </a:p>
@@ -3491,7 +3495,7 @@
             <a:fld id="{FF84AD4E-A4B8-4B24-A96A-B8F68943B4EA}" type="slidenum">
               <a:rPr lang="en-US" smtClean="0"/>
               <a:pPr/>
-              <a:t>54</a:t>
+              <a:t>58</a:t>
             </a:fld>
             <a:endParaRPr lang="en-US"/>
           </a:p>
@@ -3578,7 +3582,7 @@
             <a:fld id="{FF84AD4E-A4B8-4B24-A96A-B8F68943B4EA}" type="slidenum">
               <a:rPr lang="en-US" smtClean="0"/>
               <a:pPr/>
-              <a:t>55</a:t>
+              <a:t>59</a:t>
             </a:fld>
             <a:endParaRPr lang="en-US"/>
           </a:p>
@@ -3665,7 +3669,7 @@
             <a:fld id="{FF84AD4E-A4B8-4B24-A96A-B8F68943B4EA}" type="slidenum">
               <a:rPr lang="en-US" smtClean="0"/>
               <a:pPr/>
-              <a:t>56</a:t>
+              <a:t>60</a:t>
             </a:fld>
             <a:endParaRPr lang="en-US"/>
           </a:p>
@@ -3752,7 +3756,7 @@
             <a:fld id="{FF84AD4E-A4B8-4B24-A96A-B8F68943B4EA}" type="slidenum">
               <a:rPr lang="en-US" smtClean="0"/>
               <a:pPr/>
-              <a:t>57</a:t>
+              <a:t>61</a:t>
             </a:fld>
             <a:endParaRPr lang="en-US"/>
           </a:p>
@@ -3839,7 +3843,7 @@
             <a:fld id="{FF84AD4E-A4B8-4B24-A96A-B8F68943B4EA}" type="slidenum">
               <a:rPr lang="en-US" smtClean="0"/>
               <a:pPr/>
-              <a:t>58</a:t>
+              <a:t>62</a:t>
             </a:fld>
             <a:endParaRPr lang="en-US"/>
           </a:p>
@@ -3926,7 +3930,7 @@
             <a:fld id="{FF84AD4E-A4B8-4B24-A96A-B8F68943B4EA}" type="slidenum">
               <a:rPr lang="en-US" smtClean="0"/>
               <a:pPr/>
-              <a:t>59</a:t>
+              <a:t>63</a:t>
             </a:fld>
             <a:endParaRPr lang="en-US"/>
           </a:p>
@@ -4013,7 +4017,7 @@
             <a:fld id="{FF84AD4E-A4B8-4B24-A96A-B8F68943B4EA}" type="slidenum">
               <a:rPr lang="en-US" smtClean="0"/>
               <a:pPr/>
-              <a:t>60</a:t>
+              <a:t>64</a:t>
             </a:fld>
             <a:endParaRPr lang="en-US"/>
           </a:p>
@@ -4100,7 +4104,7 @@
             <a:fld id="{FF84AD4E-A4B8-4B24-A96A-B8F68943B4EA}" type="slidenum">
               <a:rPr lang="en-US" smtClean="0"/>
               <a:pPr/>
-              <a:t>61</a:t>
+              <a:t>65</a:t>
             </a:fld>
             <a:endParaRPr lang="en-US"/>
           </a:p>
@@ -4187,7 +4191,7 @@
             <a:fld id="{FF84AD4E-A4B8-4B24-A96A-B8F68943B4EA}" type="slidenum">
               <a:rPr lang="en-US" smtClean="0"/>
               <a:pPr/>
-              <a:t>62</a:t>
+              <a:t>66</a:t>
             </a:fld>
             <a:endParaRPr lang="en-US"/>
           </a:p>
@@ -4274,7 +4278,7 @@
             <a:fld id="{FF84AD4E-A4B8-4B24-A96A-B8F68943B4EA}" type="slidenum">
               <a:rPr lang="en-US" smtClean="0"/>
               <a:pPr/>
-              <a:t>63</a:t>
+              <a:t>67</a:t>
             </a:fld>
             <a:endParaRPr lang="en-US"/>
           </a:p>
@@ -4448,7 +4452,7 @@
             <a:fld id="{FF84AD4E-A4B8-4B24-A96A-B8F68943B4EA}" type="slidenum">
               <a:rPr lang="en-US" smtClean="0"/>
               <a:pPr/>
-              <a:t>64</a:t>
+              <a:t>68</a:t>
             </a:fld>
             <a:endParaRPr lang="en-US"/>
           </a:p>
@@ -4535,7 +4539,7 @@
             <a:fld id="{FF84AD4E-A4B8-4B24-A96A-B8F68943B4EA}" type="slidenum">
               <a:rPr lang="en-US" smtClean="0"/>
               <a:pPr/>
-              <a:t>65</a:t>
+              <a:t>69</a:t>
             </a:fld>
             <a:endParaRPr lang="en-US"/>
           </a:p>
@@ -5082,7 +5086,7 @@
             <a:fld id="{1D8BD707-D9CF-40AE-B4C6-C98DA3205C09}" type="datetimeFigureOut">
               <a:rPr lang="en-US" smtClean="0"/>
               <a:pPr/>
-              <a:t>4/3/2018</a:t>
+              <a:t>4/5/2018</a:t>
             </a:fld>
             <a:endParaRPr lang="en-US"/>
           </a:p>
@@ -5247,7 +5251,7 @@
             <a:fld id="{1D8BD707-D9CF-40AE-B4C6-C98DA3205C09}" type="datetimeFigureOut">
               <a:rPr lang="en-US" smtClean="0"/>
               <a:pPr/>
-              <a:t>4/3/2018</a:t>
+              <a:t>4/5/2018</a:t>
             </a:fld>
             <a:endParaRPr lang="en-US"/>
           </a:p>
@@ -5422,7 +5426,7 @@
             <a:fld id="{1D8BD707-D9CF-40AE-B4C6-C98DA3205C09}" type="datetimeFigureOut">
               <a:rPr lang="en-US" smtClean="0"/>
               <a:pPr/>
-              <a:t>4/3/2018</a:t>
+              <a:t>4/5/2018</a:t>
             </a:fld>
             <a:endParaRPr lang="en-US"/>
           </a:p>
@@ -5587,7 +5591,7 @@
             <a:fld id="{1D8BD707-D9CF-40AE-B4C6-C98DA3205C09}" type="datetimeFigureOut">
               <a:rPr lang="en-US" smtClean="0"/>
               <a:pPr/>
-              <a:t>4/3/2018</a:t>
+              <a:t>4/5/2018</a:t>
             </a:fld>
             <a:endParaRPr lang="en-US"/>
           </a:p>
@@ -5829,7 +5833,7 @@
             <a:fld id="{1D8BD707-D9CF-40AE-B4C6-C98DA3205C09}" type="datetimeFigureOut">
               <a:rPr lang="en-US" smtClean="0"/>
               <a:pPr/>
-              <a:t>4/3/2018</a:t>
+              <a:t>4/5/2018</a:t>
             </a:fld>
             <a:endParaRPr lang="en-US"/>
           </a:p>
@@ -6111,7 +6115,7 @@
             <a:fld id="{1D8BD707-D9CF-40AE-B4C6-C98DA3205C09}" type="datetimeFigureOut">
               <a:rPr lang="en-US" smtClean="0"/>
               <a:pPr/>
-              <a:t>4/3/2018</a:t>
+              <a:t>4/5/2018</a:t>
             </a:fld>
             <a:endParaRPr lang="en-US"/>
           </a:p>
@@ -6527,7 +6531,7 @@
             <a:fld id="{1D8BD707-D9CF-40AE-B4C6-C98DA3205C09}" type="datetimeFigureOut">
               <a:rPr lang="en-US" smtClean="0"/>
               <a:pPr/>
-              <a:t>4/3/2018</a:t>
+              <a:t>4/5/2018</a:t>
             </a:fld>
             <a:endParaRPr lang="en-US"/>
           </a:p>
@@ -6641,7 +6645,7 @@
             <a:fld id="{1D8BD707-D9CF-40AE-B4C6-C98DA3205C09}" type="datetimeFigureOut">
               <a:rPr lang="en-US" smtClean="0"/>
               <a:pPr/>
-              <a:t>4/3/2018</a:t>
+              <a:t>4/5/2018</a:t>
             </a:fld>
             <a:endParaRPr lang="en-US"/>
           </a:p>
@@ -6733,7 +6737,7 @@
             <a:fld id="{1D8BD707-D9CF-40AE-B4C6-C98DA3205C09}" type="datetimeFigureOut">
               <a:rPr lang="en-US" smtClean="0"/>
               <a:pPr/>
-              <a:t>4/3/2018</a:t>
+              <a:t>4/5/2018</a:t>
             </a:fld>
             <a:endParaRPr lang="en-US"/>
           </a:p>
@@ -7005,7 +7009,7 @@
             <a:fld id="{1D8BD707-D9CF-40AE-B4C6-C98DA3205C09}" type="datetimeFigureOut">
               <a:rPr lang="en-US" smtClean="0"/>
               <a:pPr/>
-              <a:t>4/3/2018</a:t>
+              <a:t>4/5/2018</a:t>
             </a:fld>
             <a:endParaRPr lang="en-US"/>
           </a:p>
@@ -7254,7 +7258,7 @@
             <a:fld id="{1D8BD707-D9CF-40AE-B4C6-C98DA3205C09}" type="datetimeFigureOut">
               <a:rPr lang="en-US" smtClean="0"/>
               <a:pPr/>
-              <a:t>4/3/2018</a:t>
+              <a:t>4/5/2018</a:t>
             </a:fld>
             <a:endParaRPr lang="en-US"/>
           </a:p>
@@ -7462,7 +7466,7 @@
             <a:fld id="{1D8BD707-D9CF-40AE-B4C6-C98DA3205C09}" type="datetimeFigureOut">
               <a:rPr lang="en-US" smtClean="0"/>
               <a:pPr/>
-              <a:t>4/3/2018</a:t>
+              <a:t>4/5/2018</a:t>
             </a:fld>
             <a:endParaRPr lang="en-US"/>
           </a:p>
@@ -8872,7 +8876,7 @@
           <a:graphicData uri="http://schemas.openxmlformats.org/presentationml/2006/ole">
             <mc:AlternateContent xmlns:mc="http://schemas.openxmlformats.org/markup-compatibility/2006">
               <mc:Choice xmlns:v="urn:schemas-microsoft-com:vml" Requires="v">
-                <p:oleObj spid="_x0000_s1030" name="Equation" r:id="rId4" imgW="723600" imgH="1371600" progId="Equation.3">
+                <p:oleObj spid="_x0000_s1040" name="Equation" r:id="rId4" imgW="723600" imgH="1371600" progId="Equation.3">
                   <p:embed/>
                 </p:oleObj>
               </mc:Choice>
@@ -9610,7 +9614,7 @@
           <a:graphicData uri="http://schemas.openxmlformats.org/presentationml/2006/ole">
             <mc:AlternateContent xmlns:mc="http://schemas.openxmlformats.org/markup-compatibility/2006">
               <mc:Choice xmlns:v="urn:schemas-microsoft-com:vml" Requires="v">
-                <p:oleObj spid="_x0000_s2054" name="Equation" r:id="rId6" imgW="2514600" imgH="711000" progId="Equation.3">
+                <p:oleObj spid="_x0000_s2064" name="Equation" r:id="rId6" imgW="2514600" imgH="711000" progId="Equation.3">
                   <p:embed/>
                 </p:oleObj>
               </mc:Choice>
@@ -11710,7 +11714,7 @@
           <a:graphicData uri="http://schemas.openxmlformats.org/presentationml/2006/ole">
             <mc:AlternateContent xmlns:mc="http://schemas.openxmlformats.org/markup-compatibility/2006">
               <mc:Choice xmlns:v="urn:schemas-microsoft-com:vml" Requires="v">
-                <p:oleObj spid="_x0000_s3078" name="Bitmap Image" r:id="rId4" imgW="4866667" imgH="5885714" progId="PBrush">
+                <p:oleObj spid="_x0000_s3088" name="Bitmap Image" r:id="rId4" imgW="4866667" imgH="5885714" progId="PBrush">
                   <p:embed/>
                 </p:oleObj>
               </mc:Choice>
@@ -12725,7 +12729,7 @@
           <a:graphicData uri="http://schemas.openxmlformats.org/presentationml/2006/ole">
             <mc:AlternateContent xmlns:mc="http://schemas.openxmlformats.org/markup-compatibility/2006">
               <mc:Choice xmlns:v="urn:schemas-microsoft-com:vml" Requires="v">
-                <p:oleObj spid="_x0000_s4102" name="Bitmap Image" r:id="rId4" imgW="9152381" imgH="5761905" progId="PBrush">
+                <p:oleObj spid="_x0000_s4112" name="Bitmap Image" r:id="rId4" imgW="9152381" imgH="5761905" progId="PBrush">
                   <p:embed/>
                 </p:oleObj>
               </mc:Choice>
@@ -12953,7 +12957,7 @@
             <a:graphicData uri="http://schemas.openxmlformats.org/presentationml/2006/ole">
               <mc:AlternateContent xmlns:mc="http://schemas.openxmlformats.org/markup-compatibility/2006">
                 <mc:Choice xmlns:v="urn:schemas-microsoft-com:vml" Requires="v">
-                  <p:oleObj spid="_x0000_s5130" name="Bitmap Image" r:id="rId4" imgW="4704762" imgH="8371429" progId="PBrush">
+                  <p:oleObj spid="_x0000_s5150" name="Bitmap Image" r:id="rId4" imgW="4704762" imgH="8371429" progId="PBrush">
                     <p:embed/>
                   </p:oleObj>
                 </mc:Choice>
@@ -13185,7 +13189,7 @@
             <a:graphicData uri="http://schemas.openxmlformats.org/presentationml/2006/ole">
               <mc:AlternateContent xmlns:mc="http://schemas.openxmlformats.org/markup-compatibility/2006">
                 <mc:Choice xmlns:v="urn:schemas-microsoft-com:vml" Requires="v">
-                  <p:oleObj spid="_x0000_s5131" name="Bitmap Image" r:id="rId6" imgW="7914286" imgH="6485714" progId="PBrush">
+                  <p:oleObj spid="_x0000_s5151" name="Bitmap Image" r:id="rId6" imgW="7914286" imgH="6485714" progId="PBrush">
                     <p:embed/>
                   </p:oleObj>
                 </mc:Choice>
@@ -13465,7 +13469,7 @@
           <a:graphicData uri="http://schemas.openxmlformats.org/presentationml/2006/ole">
             <mc:AlternateContent xmlns:mc="http://schemas.openxmlformats.org/markup-compatibility/2006">
               <mc:Choice xmlns:v="urn:schemas-microsoft-com:vml" Requires="v">
-                <p:oleObj spid="_x0000_s6150" name="Bitmap Image" r:id="rId4" imgW="9152381" imgH="5761905" progId="PBrush">
+                <p:oleObj spid="_x0000_s6160" name="Bitmap Image" r:id="rId4" imgW="9152381" imgH="5761905" progId="PBrush">
                   <p:embed/>
                 </p:oleObj>
               </mc:Choice>
@@ -14351,7 +14355,7 @@
           <a:graphicData uri="http://schemas.openxmlformats.org/presentationml/2006/ole">
             <mc:AlternateContent xmlns:mc="http://schemas.openxmlformats.org/markup-compatibility/2006">
               <mc:Choice xmlns:v="urn:schemas-microsoft-com:vml" Requires="v">
-                <p:oleObj spid="_x0000_s7174" name="Bitmap Image" r:id="rId4" imgW="10240804" imgH="8238095" progId="PBrush">
+                <p:oleObj spid="_x0000_s7184" name="Bitmap Image" r:id="rId4" imgW="10240804" imgH="8238095" progId="PBrush">
                   <p:embed/>
                 </p:oleObj>
               </mc:Choice>
@@ -16675,7 +16679,7 @@
           <a:graphicData uri="http://schemas.openxmlformats.org/presentationml/2006/ole">
             <mc:AlternateContent xmlns:mc="http://schemas.openxmlformats.org/markup-compatibility/2006">
               <mc:Choice xmlns:v="urn:schemas-microsoft-com:vml" Requires="v">
-                <p:oleObj spid="_x0000_s8198" name="Equation" r:id="rId4" imgW="2235200" imgH="622300" progId="Equation.3">
+                <p:oleObj spid="_x0000_s8208" name="Equation" r:id="rId4" imgW="2235200" imgH="622300" progId="Equation.3">
                   <p:embed/>
                 </p:oleObj>
               </mc:Choice>
@@ -19129,7 +19133,7 @@
           <a:graphicData uri="http://schemas.openxmlformats.org/presentationml/2006/ole">
             <mc:AlternateContent xmlns:mc="http://schemas.openxmlformats.org/markup-compatibility/2006">
               <mc:Choice xmlns:v="urn:schemas-microsoft-com:vml" Requires="v">
-                <p:oleObj spid="_x0000_s9222" name="Equation" r:id="rId4" imgW="1905000" imgH="889000" progId="Equation.3">
+                <p:oleObj spid="_x0000_s9232" name="Equation" r:id="rId4" imgW="1905000" imgH="889000" progId="Equation.3">
                   <p:embed/>
                 </p:oleObj>
               </mc:Choice>
@@ -19255,14 +19259,20 @@
       </p:grpSpPr>
       <p:sp>
         <p:nvSpPr>
-          <p:cNvPr id="6" name="TextBox 5"/>
+          <p:cNvPr id="4" name="TextBox 3">
+            <a:extLst>
+              <a:ext uri="{FF2B5EF4-FFF2-40B4-BE49-F238E27FC236}">
+                <a16:creationId xmlns:a16="http://schemas.microsoft.com/office/drawing/2014/main" id="{C336C260-056C-41EB-B034-31C6678066D2}"/>
+              </a:ext>
+            </a:extLst>
+          </p:cNvPr>
           <p:cNvSpPr txBox="1"/>
           <p:nvPr/>
         </p:nvSpPr>
         <p:spPr>
           <a:xfrm>
-            <a:off x="304800" y="304800"/>
-            <a:ext cx="6026009" cy="1200329"/>
+            <a:off x="767080" y="152400"/>
+            <a:ext cx="4653838" cy="461665"/>
           </a:xfrm>
           <a:prstGeom prst="rect">
             <a:avLst/>
@@ -19276,64 +19286,114 @@
           <a:lstStyle/>
           <a:p>
             <a:r>
+              <a:rPr lang="en-US" sz="2400" dirty="0">
+                <a:latin typeface="Arial" panose="020B0604020202020204" pitchFamily="34" charset="0"/>
+              </a:rPr>
+              <a:t>Consider a simulated 2D dataset</a:t>
+            </a:r>
+          </a:p>
+        </p:txBody>
+      </p:sp>
+      <p:sp>
+        <p:nvSpPr>
+          <p:cNvPr id="5" name="Rectangle 4">
+            <a:extLst>
+              <a:ext uri="{FF2B5EF4-FFF2-40B4-BE49-F238E27FC236}">
+                <a16:creationId xmlns:a16="http://schemas.microsoft.com/office/drawing/2014/main" id="{43C5526C-515B-474F-A00C-00861B3A3C24}"/>
+              </a:ext>
+            </a:extLst>
+          </p:cNvPr>
+          <p:cNvSpPr/>
+          <p:nvPr/>
+        </p:nvSpPr>
+        <p:spPr>
+          <a:xfrm>
+            <a:off x="228600" y="6336268"/>
+            <a:ext cx="9220200" cy="369332"/>
+          </a:xfrm>
+          <a:prstGeom prst="rect">
+            <a:avLst/>
+          </a:prstGeom>
+        </p:spPr>
+        <p:txBody>
+          <a:bodyPr wrap="square">
+            <a:spAutoFit/>
+          </a:bodyPr>
+          <a:lstStyle/>
+          <a:p>
+            <a:r>
               <a:rPr lang="en-US" dirty="0"/>
-              <a:t>Correlated variables in linear models</a:t>
-            </a:r>
-          </a:p>
-          <a:p>
-            <a:r>
-              <a:rPr lang="en-US" dirty="0"/>
-              <a:t>PCA in concepts</a:t>
-            </a:r>
-          </a:p>
-          <a:p>
-            <a:r>
-              <a:rPr lang="en-US" dirty="0"/>
-              <a:t>PCA in equations</a:t>
-            </a:r>
-          </a:p>
-          <a:p>
-            <a:r>
-              <a:rPr lang="en-US" dirty="0"/>
-              <a:t>PCA in Java (for your reference; not covered in class or in final)</a:t>
-            </a:r>
-          </a:p>
-        </p:txBody>
-      </p:sp>
-      <p:cxnSp>
-        <p:nvCxnSpPr>
-          <p:cNvPr id="7" name="Straight Arrow Connector 6"/>
-          <p:cNvCxnSpPr/>
-          <p:nvPr/>
-        </p:nvCxnSpPr>
-        <p:spPr>
-          <a:xfrm rot="10800000">
-            <a:off x="6248400" y="1295400"/>
-            <a:ext cx="533400" cy="1588"/>
-          </a:xfrm>
-          <a:prstGeom prst="straightConnector1">
-            <a:avLst/>
-          </a:prstGeom>
-          <a:ln>
-            <a:tailEnd type="arrow"/>
-          </a:ln>
-        </p:spPr>
-        <p:style>
-          <a:lnRef idx="1">
-            <a:schemeClr val="accent1"/>
-          </a:lnRef>
-          <a:fillRef idx="0">
-            <a:schemeClr val="accent1"/>
-          </a:fillRef>
-          <a:effectRef idx="0">
-            <a:schemeClr val="accent1"/>
-          </a:effectRef>
-          <a:fontRef idx="minor">
-            <a:schemeClr val="tx1"/>
-          </a:fontRef>
-        </p:style>
-      </p:cxnSp>
+              <a:t>https://github.com/afodor/metagenomicsTools/blob/master/src/classExamples/pcaSim.txt</a:t>
+            </a:r>
+          </a:p>
+        </p:txBody>
+      </p:sp>
+      <p:pic>
+        <p:nvPicPr>
+          <p:cNvPr id="6" name="Picture 5">
+            <a:extLst>
+              <a:ext uri="{FF2B5EF4-FFF2-40B4-BE49-F238E27FC236}">
+                <a16:creationId xmlns:a16="http://schemas.microsoft.com/office/drawing/2014/main" id="{65573A55-00BF-4876-B688-84AABE52072E}"/>
+              </a:ext>
+            </a:extLst>
+          </p:cNvPr>
+          <p:cNvPicPr>
+            <a:picLocks noChangeAspect="1"/>
+          </p:cNvPicPr>
+          <p:nvPr/>
+        </p:nvPicPr>
+        <p:blipFill>
+          <a:blip r:embed="rId2"/>
+          <a:stretch>
+            <a:fillRect/>
+          </a:stretch>
+        </p:blipFill>
+        <p:spPr>
+          <a:xfrm>
+            <a:off x="457200" y="762000"/>
+            <a:ext cx="4643006" cy="5105400"/>
+          </a:xfrm>
+          <a:prstGeom prst="rect">
+            <a:avLst/>
+          </a:prstGeom>
+        </p:spPr>
+      </p:pic>
+      <p:pic>
+        <p:nvPicPr>
+          <p:cNvPr id="8" name="Picture 7">
+            <a:extLst>
+              <a:ext uri="{FF2B5EF4-FFF2-40B4-BE49-F238E27FC236}">
+                <a16:creationId xmlns:a16="http://schemas.microsoft.com/office/drawing/2014/main" id="{D1203313-CA00-45AF-979C-333FFED2F103}"/>
+              </a:ext>
+            </a:extLst>
+          </p:cNvPr>
+          <p:cNvPicPr>
+            <a:picLocks noChangeAspect="1"/>
+          </p:cNvPicPr>
+          <p:nvPr/>
+        </p:nvPicPr>
+        <p:blipFill>
+          <a:blip r:embed="rId3"/>
+          <a:stretch>
+            <a:fillRect/>
+          </a:stretch>
+        </p:blipFill>
+        <p:spPr>
+          <a:xfrm>
+            <a:off x="4114800" y="762000"/>
+            <a:ext cx="4925691" cy="4465127"/>
+          </a:xfrm>
+          <a:prstGeom prst="rect">
+            <a:avLst/>
+          </a:prstGeom>
+        </p:spPr>
+      </p:pic>
     </p:spTree>
+    <p:extLst>
+      <p:ext uri="{BB962C8B-B14F-4D97-AF65-F5344CB8AC3E}">
+        <p14:creationId xmlns:p14="http://schemas.microsoft.com/office/powerpoint/2010/main" val="128402851"/>
+      </p:ext>
+    </p:extLst>
   </p:cSld>
   <p:clrMapOvr>
     <a:masterClrMapping/>
@@ -19360,101 +19420,183 @@
       </p:grpSpPr>
       <p:sp>
         <p:nvSpPr>
-          <p:cNvPr id="4" name="TextBox 3"/>
+          <p:cNvPr id="4" name="TextBox 3">
+            <a:extLst>
+              <a:ext uri="{FF2B5EF4-FFF2-40B4-BE49-F238E27FC236}">
+                <a16:creationId xmlns:a16="http://schemas.microsoft.com/office/drawing/2014/main" id="{39FE784A-83B4-4017-84B7-C5EE238D1253}"/>
+              </a:ext>
+            </a:extLst>
+          </p:cNvPr>
           <p:cNvSpPr txBox="1"/>
           <p:nvPr/>
         </p:nvSpPr>
         <p:spPr>
-          <a:xfrm>
-            <a:off x="1066800" y="468868"/>
-            <a:ext cx="5818452" cy="369332"/>
-          </a:xfrm>
-          <a:prstGeom prst="rect">
-            <a:avLst/>
-          </a:prstGeom>
-          <a:noFill/>
-        </p:spPr>
-        <p:txBody>
-          <a:bodyPr wrap="none" rtlCol="0">
+          <a:xfrm flipH="1">
+            <a:off x="533400" y="381000"/>
+            <a:ext cx="7772400" cy="369332"/>
+          </a:xfrm>
+          <a:prstGeom prst="rect">
+            <a:avLst/>
+          </a:prstGeom>
+          <a:noFill/>
+        </p:spPr>
+        <p:txBody>
+          <a:bodyPr wrap="square" rtlCol="0">
             <a:spAutoFit/>
           </a:bodyPr>
           <a:lstStyle/>
           <a:p>
             <a:r>
               <a:rPr lang="en-US" dirty="0"/>
-              <a:t>If you have a linear algebra library, PCA is easy to implement</a:t>
+              <a:t>We can rotate these data any way we want to (by any </a:t>
+            </a:r>
+            <a:r>
+              <a:rPr lang="en-US" dirty="0" err="1"/>
+              <a:t>orthornoral</a:t>
+            </a:r>
+            <a:r>
+              <a:rPr lang="en-US" dirty="0"/>
+              <a:t> basis) </a:t>
             </a:r>
           </a:p>
         </p:txBody>
       </p:sp>
       <p:pic>
         <p:nvPicPr>
-          <p:cNvPr id="103426" name="Picture 2"/>
+          <p:cNvPr id="5" name="Picture 4">
+            <a:extLst>
+              <a:ext uri="{FF2B5EF4-FFF2-40B4-BE49-F238E27FC236}">
+                <a16:creationId xmlns:a16="http://schemas.microsoft.com/office/drawing/2014/main" id="{59A453A3-2085-44A0-879F-C328839898E0}"/>
+              </a:ext>
+            </a:extLst>
+          </p:cNvPr>
           <p:cNvPicPr>
-            <a:picLocks noChangeAspect="1" noChangeArrowheads="1"/>
+            <a:picLocks noChangeAspect="1"/>
           </p:cNvPicPr>
           <p:nvPr/>
         </p:nvPicPr>
         <p:blipFill>
-          <a:blip r:embed="rId3" cstate="print"/>
-          <a:srcRect/>
+          <a:blip r:embed="rId2"/>
           <a:stretch>
             <a:fillRect/>
           </a:stretch>
         </p:blipFill>
-        <p:spPr bwMode="auto">
-          <a:xfrm>
-            <a:off x="762000" y="1066800"/>
-            <a:ext cx="7239000" cy="4310359"/>
-          </a:xfrm>
-          <a:prstGeom prst="rect">
-            <a:avLst/>
-          </a:prstGeom>
-          <a:noFill/>
-          <a:ln w="9525">
-            <a:noFill/>
-            <a:miter lim="800000"/>
-            <a:headEnd/>
-            <a:tailEnd/>
-          </a:ln>
+        <p:spPr>
+          <a:xfrm>
+            <a:off x="304800" y="914400"/>
+            <a:ext cx="7696200" cy="1316715"/>
+          </a:xfrm>
+          <a:prstGeom prst="rect">
+            <a:avLst/>
+          </a:prstGeom>
         </p:spPr>
       </p:pic>
-      <p:sp>
-        <p:nvSpPr>
-          <p:cNvPr id="6" name="TextBox 5"/>
+      <p:pic>
+        <p:nvPicPr>
+          <p:cNvPr id="6" name="Picture 5">
+            <a:extLst>
+              <a:ext uri="{FF2B5EF4-FFF2-40B4-BE49-F238E27FC236}">
+                <a16:creationId xmlns:a16="http://schemas.microsoft.com/office/drawing/2014/main" id="{545F42CF-BFA6-4924-BD18-062FE741EE33}"/>
+              </a:ext>
+            </a:extLst>
+          </p:cNvPr>
+          <p:cNvPicPr>
+            <a:picLocks noChangeAspect="1"/>
+          </p:cNvPicPr>
+          <p:nvPr/>
+        </p:nvPicPr>
+        <p:blipFill>
+          <a:blip r:embed="rId3"/>
+          <a:stretch>
+            <a:fillRect/>
+          </a:stretch>
+        </p:blipFill>
+        <p:spPr>
+          <a:xfrm>
+            <a:off x="381000" y="2514600"/>
+            <a:ext cx="7543800" cy="3472819"/>
+          </a:xfrm>
+          <a:prstGeom prst="rect">
+            <a:avLst/>
+          </a:prstGeom>
+        </p:spPr>
+      </p:pic>
+      <p:sp>
+        <p:nvSpPr>
+          <p:cNvPr id="7" name="TextBox 6">
+            <a:extLst>
+              <a:ext uri="{FF2B5EF4-FFF2-40B4-BE49-F238E27FC236}">
+                <a16:creationId xmlns:a16="http://schemas.microsoft.com/office/drawing/2014/main" id="{2FDDF523-977B-43AA-9CA2-92475A38477A}"/>
+              </a:ext>
+            </a:extLst>
+          </p:cNvPr>
           <p:cNvSpPr txBox="1"/>
           <p:nvPr/>
         </p:nvSpPr>
         <p:spPr>
           <a:xfrm>
-            <a:off x="685800" y="5791200"/>
-            <a:ext cx="8106130" cy="646331"/>
-          </a:xfrm>
-          <a:prstGeom prst="rect">
-            <a:avLst/>
-          </a:prstGeom>
-          <a:noFill/>
-        </p:spPr>
-        <p:txBody>
-          <a:bodyPr wrap="none" rtlCol="0">
+            <a:off x="1600200" y="2743200"/>
+            <a:ext cx="2057400" cy="369332"/>
+          </a:xfrm>
+          <a:prstGeom prst="rect">
+            <a:avLst/>
+          </a:prstGeom>
+          <a:noFill/>
+        </p:spPr>
+        <p:txBody>
+          <a:bodyPr wrap="square" rtlCol="0">
             <a:spAutoFit/>
           </a:bodyPr>
           <a:lstStyle/>
           <a:p>
             <a:r>
               <a:rPr lang="en-US" dirty="0"/>
-              <a:t>The National Institute of Standards and Technology has been kind enough to provide</a:t>
-            </a:r>
-          </a:p>
+              <a:t>Before rotation</a:t>
+            </a:r>
+          </a:p>
+        </p:txBody>
+      </p:sp>
+      <p:sp>
+        <p:nvSpPr>
+          <p:cNvPr id="8" name="TextBox 7">
+            <a:extLst>
+              <a:ext uri="{FF2B5EF4-FFF2-40B4-BE49-F238E27FC236}">
+                <a16:creationId xmlns:a16="http://schemas.microsoft.com/office/drawing/2014/main" id="{E3C9445F-4299-442D-B5DA-06F4493D0DEC}"/>
+              </a:ext>
+            </a:extLst>
+          </p:cNvPr>
+          <p:cNvSpPr txBox="1"/>
+          <p:nvPr/>
+        </p:nvSpPr>
+        <p:spPr>
+          <a:xfrm>
+            <a:off x="5334000" y="2754868"/>
+            <a:ext cx="2057400" cy="369332"/>
+          </a:xfrm>
+          <a:prstGeom prst="rect">
+            <a:avLst/>
+          </a:prstGeom>
+          <a:noFill/>
+        </p:spPr>
+        <p:txBody>
+          <a:bodyPr wrap="square" rtlCol="0">
+            <a:spAutoFit/>
+          </a:bodyPr>
+          <a:lstStyle/>
           <a:p>
             <a:r>
               <a:rPr lang="en-US" dirty="0"/>
-              <a:t>us with one…</a:t>
+              <a:t>After rotation</a:t>
             </a:r>
           </a:p>
         </p:txBody>
       </p:sp>
     </p:spTree>
+    <p:extLst>
+      <p:ext uri="{BB962C8B-B14F-4D97-AF65-F5344CB8AC3E}">
+        <p14:creationId xmlns:p14="http://schemas.microsoft.com/office/powerpoint/2010/main" val="2193431553"/>
+      </p:ext>
+    </p:extLst>
   </p:cSld>
   <p:clrMapOvr>
     <a:masterClrMapping/>
@@ -19481,66 +19623,152 @@
       </p:grpSpPr>
       <p:sp>
         <p:nvSpPr>
-          <p:cNvPr id="4" name="TextBox 3"/>
+          <p:cNvPr id="4" name="TextBox 3">
+            <a:extLst>
+              <a:ext uri="{FF2B5EF4-FFF2-40B4-BE49-F238E27FC236}">
+                <a16:creationId xmlns:a16="http://schemas.microsoft.com/office/drawing/2014/main" id="{873CAA90-6CE3-4256-8F93-1F749BA83BB6}"/>
+              </a:ext>
+            </a:extLst>
+          </p:cNvPr>
           <p:cNvSpPr txBox="1"/>
           <p:nvPr/>
         </p:nvSpPr>
         <p:spPr>
           <a:xfrm>
-            <a:off x="1219200" y="381000"/>
-            <a:ext cx="2850780" cy="369332"/>
-          </a:xfrm>
-          <a:prstGeom prst="rect">
-            <a:avLst/>
-          </a:prstGeom>
-          <a:noFill/>
-        </p:spPr>
-        <p:txBody>
-          <a:bodyPr wrap="none" rtlCol="0">
+            <a:off x="152400" y="39469"/>
+            <a:ext cx="8839200" cy="646331"/>
+          </a:xfrm>
+          <a:prstGeom prst="rect">
+            <a:avLst/>
+          </a:prstGeom>
+          <a:noFill/>
+        </p:spPr>
+        <p:txBody>
+          <a:bodyPr wrap="square" rtlCol="0">
             <a:spAutoFit/>
           </a:bodyPr>
           <a:lstStyle/>
           <a:p>
             <a:r>
               <a:rPr lang="en-US" dirty="0"/>
-              <a:t>1.  Subtract column means…</a:t>
+              <a:t>The PCA rotation is the rotation that guarantees that PCA1 will capture the most possible variance of the data in one dimension</a:t>
             </a:r>
           </a:p>
         </p:txBody>
       </p:sp>
       <p:pic>
         <p:nvPicPr>
-          <p:cNvPr id="105474" name="Picture 2"/>
+          <p:cNvPr id="5" name="Picture 4">
+            <a:extLst>
+              <a:ext uri="{FF2B5EF4-FFF2-40B4-BE49-F238E27FC236}">
+                <a16:creationId xmlns:a16="http://schemas.microsoft.com/office/drawing/2014/main" id="{74784AA0-F53C-4364-BF65-14B567CA6D56}"/>
+              </a:ext>
+            </a:extLst>
+          </p:cNvPr>
           <p:cNvPicPr>
-            <a:picLocks noChangeAspect="1" noChangeArrowheads="1"/>
+            <a:picLocks noChangeAspect="1"/>
           </p:cNvPicPr>
           <p:nvPr/>
         </p:nvPicPr>
         <p:blipFill>
-          <a:blip r:embed="rId3" cstate="print"/>
-          <a:srcRect/>
+          <a:blip r:embed="rId2"/>
           <a:stretch>
             <a:fillRect/>
           </a:stretch>
         </p:blipFill>
-        <p:spPr bwMode="auto">
-          <a:xfrm>
-            <a:off x="1066800" y="762000"/>
-            <a:ext cx="5800725" cy="2743200"/>
-          </a:xfrm>
-          <a:prstGeom prst="rect">
-            <a:avLst/>
-          </a:prstGeom>
-          <a:noFill/>
-          <a:ln w="9525">
-            <a:noFill/>
-            <a:miter lim="800000"/>
-            <a:headEnd/>
-            <a:tailEnd/>
-          </a:ln>
+        <p:spPr>
+          <a:xfrm>
+            <a:off x="180540" y="838200"/>
+            <a:ext cx="5534460" cy="5018077"/>
+          </a:xfrm>
+          <a:prstGeom prst="rect">
+            <a:avLst/>
+          </a:prstGeom>
         </p:spPr>
       </p:pic>
+      <p:pic>
+        <p:nvPicPr>
+          <p:cNvPr id="6" name="Picture 5">
+            <a:extLst>
+              <a:ext uri="{FF2B5EF4-FFF2-40B4-BE49-F238E27FC236}">
+                <a16:creationId xmlns:a16="http://schemas.microsoft.com/office/drawing/2014/main" id="{9768FDBF-657E-4E15-B4A3-1B1EF317DA06}"/>
+              </a:ext>
+            </a:extLst>
+          </p:cNvPr>
+          <p:cNvPicPr>
+            <a:picLocks noChangeAspect="1"/>
+          </p:cNvPicPr>
+          <p:nvPr/>
+        </p:nvPicPr>
+        <p:blipFill>
+          <a:blip r:embed="rId3"/>
+          <a:stretch>
+            <a:fillRect/>
+          </a:stretch>
+        </p:blipFill>
+        <p:spPr>
+          <a:xfrm>
+            <a:off x="4267200" y="650240"/>
+            <a:ext cx="4590228" cy="4150360"/>
+          </a:xfrm>
+          <a:prstGeom prst="rect">
+            <a:avLst/>
+          </a:prstGeom>
+        </p:spPr>
+      </p:pic>
+      <p:sp>
+        <p:nvSpPr>
+          <p:cNvPr id="7" name="TextBox 6">
+            <a:extLst>
+              <a:ext uri="{FF2B5EF4-FFF2-40B4-BE49-F238E27FC236}">
+                <a16:creationId xmlns:a16="http://schemas.microsoft.com/office/drawing/2014/main" id="{7D46D318-259D-4734-8995-95575078FA27}"/>
+              </a:ext>
+            </a:extLst>
+          </p:cNvPr>
+          <p:cNvSpPr txBox="1"/>
+          <p:nvPr/>
+        </p:nvSpPr>
+        <p:spPr>
+          <a:xfrm>
+            <a:off x="533400" y="5867400"/>
+            <a:ext cx="7907486" cy="923330"/>
+          </a:xfrm>
+          <a:prstGeom prst="rect">
+            <a:avLst/>
+          </a:prstGeom>
+          <a:noFill/>
+        </p:spPr>
+        <p:txBody>
+          <a:bodyPr wrap="none" rtlCol="0">
+            <a:spAutoFit/>
+          </a:bodyPr>
+          <a:lstStyle/>
+          <a:p>
+            <a:r>
+              <a:rPr lang="en-US" dirty="0"/>
+              <a:t>We have the option of doing inference (comparing for example red. vs. blue)</a:t>
+            </a:r>
+          </a:p>
+          <a:p>
+            <a:r>
+              <a:rPr lang="en-US" dirty="0"/>
+              <a:t>in one-dimension (with, for example, a simple t-test) even though we started with </a:t>
+            </a:r>
+          </a:p>
+          <a:p>
+            <a:r>
+              <a:rPr lang="en-US" dirty="0"/>
+              <a:t>two correlated variables)</a:t>
+            </a:r>
+          </a:p>
+        </p:txBody>
+      </p:sp>
     </p:spTree>
+    <p:extLst>
+      <p:ext uri="{BB962C8B-B14F-4D97-AF65-F5344CB8AC3E}">
+        <p14:creationId xmlns:p14="http://schemas.microsoft.com/office/powerpoint/2010/main" val="1163606500"/>
+      </p:ext>
+    </p:extLst>
   </p:cSld>
   <p:clrMapOvr>
     <a:masterClrMapping/>
@@ -19567,14 +19795,20 @@
       </p:grpSpPr>
       <p:sp>
         <p:nvSpPr>
-          <p:cNvPr id="4" name="TextBox 3"/>
+          <p:cNvPr id="5" name="TextBox 4">
+            <a:extLst>
+              <a:ext uri="{FF2B5EF4-FFF2-40B4-BE49-F238E27FC236}">
+                <a16:creationId xmlns:a16="http://schemas.microsoft.com/office/drawing/2014/main" id="{7EF7EE0A-AE38-405B-A8E5-787658C67513}"/>
+              </a:ext>
+            </a:extLst>
+          </p:cNvPr>
           <p:cNvSpPr txBox="1"/>
           <p:nvPr/>
         </p:nvSpPr>
         <p:spPr>
           <a:xfrm>
-            <a:off x="1219200" y="0"/>
-            <a:ext cx="2949397" cy="369332"/>
+            <a:off x="284480" y="76200"/>
+            <a:ext cx="7907486" cy="923330"/>
           </a:xfrm>
           <a:prstGeom prst="rect">
             <a:avLst/>
@@ -19589,76 +19823,89 @@
           <a:p>
             <a:r>
               <a:rPr lang="en-US" dirty="0"/>
-              <a:t>2.  Find the covariance matrix</a:t>
+              <a:t>We have the option of doing inference (comparing for example red. vs. blue)</a:t>
+            </a:r>
+          </a:p>
+          <a:p>
+            <a:r>
+              <a:rPr lang="en-US" dirty="0"/>
+              <a:t>in one-dimension (with, for example, a simple t-test) even though we started with </a:t>
+            </a:r>
+          </a:p>
+          <a:p>
+            <a:r>
+              <a:rPr lang="en-US" dirty="0"/>
+              <a:t>two correlated variables)</a:t>
             </a:r>
           </a:p>
         </p:txBody>
       </p:sp>
       <p:pic>
         <p:nvPicPr>
-          <p:cNvPr id="106498" name="Picture 2"/>
+          <p:cNvPr id="6" name="Picture 5">
+            <a:extLst>
+              <a:ext uri="{FF2B5EF4-FFF2-40B4-BE49-F238E27FC236}">
+                <a16:creationId xmlns:a16="http://schemas.microsoft.com/office/drawing/2014/main" id="{0CD88892-7492-416E-890C-F45C07DF766C}"/>
+              </a:ext>
+            </a:extLst>
+          </p:cNvPr>
           <p:cNvPicPr>
-            <a:picLocks noChangeAspect="1" noChangeArrowheads="1"/>
+            <a:picLocks noChangeAspect="1"/>
           </p:cNvPicPr>
           <p:nvPr/>
         </p:nvPicPr>
         <p:blipFill>
-          <a:blip r:embed="rId3" cstate="print"/>
-          <a:srcRect/>
+          <a:blip r:embed="rId2"/>
           <a:stretch>
             <a:fillRect/>
           </a:stretch>
         </p:blipFill>
-        <p:spPr bwMode="auto">
-          <a:xfrm>
-            <a:off x="228600" y="304800"/>
-            <a:ext cx="5476875" cy="4019550"/>
-          </a:xfrm>
-          <a:prstGeom prst="rect">
-            <a:avLst/>
-          </a:prstGeom>
-          <a:noFill/>
-          <a:ln w="9525">
-            <a:noFill/>
-            <a:miter lim="800000"/>
-            <a:headEnd/>
-            <a:tailEnd/>
-          </a:ln>
+        <p:spPr>
+          <a:xfrm>
+            <a:off x="5791200" y="4267200"/>
+            <a:ext cx="2590800" cy="2202386"/>
+          </a:xfrm>
+          <a:prstGeom prst="rect">
+            <a:avLst/>
+          </a:prstGeom>
         </p:spPr>
       </p:pic>
       <p:pic>
         <p:nvPicPr>
-          <p:cNvPr id="106499" name="Picture 3"/>
+          <p:cNvPr id="7" name="Picture 6">
+            <a:extLst>
+              <a:ext uri="{FF2B5EF4-FFF2-40B4-BE49-F238E27FC236}">
+                <a16:creationId xmlns:a16="http://schemas.microsoft.com/office/drawing/2014/main" id="{122E9431-E656-4486-91ED-EC3F3154FB9B}"/>
+              </a:ext>
+            </a:extLst>
+          </p:cNvPr>
           <p:cNvPicPr>
-            <a:picLocks noChangeAspect="1" noChangeArrowheads="1"/>
+            <a:picLocks noChangeAspect="1"/>
           </p:cNvPicPr>
           <p:nvPr/>
         </p:nvPicPr>
         <p:blipFill>
-          <a:blip r:embed="rId4" cstate="print"/>
-          <a:srcRect/>
+          <a:blip r:embed="rId3"/>
           <a:stretch>
             <a:fillRect/>
           </a:stretch>
         </p:blipFill>
-        <p:spPr bwMode="auto">
-          <a:xfrm>
-            <a:off x="3429000" y="3810000"/>
-            <a:ext cx="4648200" cy="2842910"/>
-          </a:xfrm>
-          <a:prstGeom prst="rect">
-            <a:avLst/>
-          </a:prstGeom>
-          <a:noFill/>
-          <a:ln w="9525">
-            <a:noFill/>
-            <a:miter lim="800000"/>
-            <a:headEnd/>
-            <a:tailEnd/>
-          </a:ln>
+        <p:spPr>
+          <a:xfrm>
+            <a:off x="0" y="1066800"/>
+            <a:ext cx="7620000" cy="3284896"/>
+          </a:xfrm>
+          <a:prstGeom prst="rect">
+            <a:avLst/>
+          </a:prstGeom>
         </p:spPr>
       </p:pic>
     </p:spTree>
+    <p:extLst>
+      <p:ext uri="{BB962C8B-B14F-4D97-AF65-F5344CB8AC3E}">
+        <p14:creationId xmlns:p14="http://schemas.microsoft.com/office/powerpoint/2010/main" val="3295272170"/>
+      </p:ext>
+    </p:extLst>
   </p:cSld>
   <p:clrMapOvr>
     <a:masterClrMapping/>
@@ -19683,145 +19930,63 @@
           <a:chExt cx="0" cy="0"/>
         </a:xfrm>
       </p:grpSpPr>
-      <p:pic>
-        <p:nvPicPr>
-          <p:cNvPr id="107522" name="Picture 2"/>
-          <p:cNvPicPr>
-            <a:picLocks noChangeAspect="1" noChangeArrowheads="1"/>
-          </p:cNvPicPr>
-          <p:nvPr/>
-        </p:nvPicPr>
-        <p:blipFill>
-          <a:blip r:embed="rId3" cstate="print"/>
-          <a:srcRect/>
-          <a:stretch>
-            <a:fillRect/>
-          </a:stretch>
-        </p:blipFill>
-        <p:spPr bwMode="auto">
-          <a:xfrm>
-            <a:off x="685800" y="1447800"/>
-            <a:ext cx="4248150" cy="2571750"/>
-          </a:xfrm>
-          <a:prstGeom prst="rect">
-            <a:avLst/>
-          </a:prstGeom>
-          <a:noFill/>
-          <a:ln w="9525">
-            <a:noFill/>
-            <a:miter lim="800000"/>
-            <a:headEnd/>
-            <a:tailEnd/>
-          </a:ln>
-        </p:spPr>
-      </p:pic>
-      <p:pic>
-        <p:nvPicPr>
-          <p:cNvPr id="107523" name="Picture 3"/>
-          <p:cNvPicPr>
-            <a:picLocks noChangeAspect="1" noChangeArrowheads="1"/>
-          </p:cNvPicPr>
-          <p:nvPr/>
-        </p:nvPicPr>
-        <p:blipFill>
-          <a:blip r:embed="rId4" cstate="print"/>
-          <a:srcRect/>
-          <a:stretch>
-            <a:fillRect/>
-          </a:stretch>
-        </p:blipFill>
-        <p:spPr bwMode="auto">
-          <a:xfrm>
-            <a:off x="457200" y="3962400"/>
-            <a:ext cx="5181600" cy="1543050"/>
-          </a:xfrm>
-          <a:prstGeom prst="rect">
-            <a:avLst/>
-          </a:prstGeom>
-          <a:noFill/>
-          <a:ln w="9525">
-            <a:noFill/>
-            <a:miter lim="800000"/>
-            <a:headEnd/>
-            <a:tailEnd/>
-          </a:ln>
-        </p:spPr>
-      </p:pic>
-      <p:pic>
-        <p:nvPicPr>
-          <p:cNvPr id="6" name="Picture 2"/>
-          <p:cNvPicPr>
-            <a:picLocks noChangeAspect="1" noChangeArrowheads="1"/>
-          </p:cNvPicPr>
-          <p:nvPr/>
-        </p:nvPicPr>
-        <p:blipFill>
-          <a:blip r:embed="rId5" cstate="print"/>
-          <a:srcRect/>
-          <a:stretch>
-            <a:fillRect/>
-          </a:stretch>
-        </p:blipFill>
-        <p:spPr bwMode="auto">
-          <a:xfrm>
-            <a:off x="4114800" y="457200"/>
-            <a:ext cx="5229225" cy="1266825"/>
-          </a:xfrm>
-          <a:prstGeom prst="rect">
-            <a:avLst/>
-          </a:prstGeom>
-          <a:noFill/>
-          <a:ln w="9525">
-            <a:noFill/>
-            <a:miter lim="800000"/>
-            <a:headEnd/>
-            <a:tailEnd/>
-          </a:ln>
-        </p:spPr>
-      </p:pic>
+      <p:sp>
+        <p:nvSpPr>
+          <p:cNvPr id="6" name="TextBox 5"/>
+          <p:cNvSpPr txBox="1"/>
+          <p:nvPr/>
+        </p:nvSpPr>
+        <p:spPr>
+          <a:xfrm>
+            <a:off x="304800" y="304800"/>
+            <a:ext cx="6026009" cy="1200329"/>
+          </a:xfrm>
+          <a:prstGeom prst="rect">
+            <a:avLst/>
+          </a:prstGeom>
+          <a:noFill/>
+        </p:spPr>
+        <p:txBody>
+          <a:bodyPr wrap="none" rtlCol="0">
+            <a:spAutoFit/>
+          </a:bodyPr>
+          <a:lstStyle/>
+          <a:p>
+            <a:r>
+              <a:rPr lang="en-US" dirty="0"/>
+              <a:t>Correlated variables in linear models</a:t>
+            </a:r>
+          </a:p>
+          <a:p>
+            <a:r>
+              <a:rPr lang="en-US" dirty="0"/>
+              <a:t>PCA in concepts</a:t>
+            </a:r>
+          </a:p>
+          <a:p>
+            <a:r>
+              <a:rPr lang="en-US" dirty="0"/>
+              <a:t>PCA in equations</a:t>
+            </a:r>
+          </a:p>
+          <a:p>
+            <a:r>
+              <a:rPr lang="en-US" dirty="0"/>
+              <a:t>PCA in Java (for your reference; not covered in class or in final)</a:t>
+            </a:r>
+          </a:p>
+        </p:txBody>
+      </p:sp>
       <p:cxnSp>
         <p:nvCxnSpPr>
-          <p:cNvPr id="8" name="Straight Arrow Connector 7"/>
+          <p:cNvPr id="7" name="Straight Arrow Connector 6"/>
           <p:cNvCxnSpPr/>
           <p:nvPr/>
         </p:nvCxnSpPr>
         <p:spPr>
-          <a:xfrm flipV="1">
-            <a:off x="4191000" y="1447800"/>
-            <a:ext cx="533400" cy="228600"/>
-          </a:xfrm>
-          <a:prstGeom prst="straightConnector1">
-            <a:avLst/>
-          </a:prstGeom>
-          <a:ln>
-            <a:tailEnd type="arrow"/>
-          </a:ln>
-        </p:spPr>
-        <p:style>
-          <a:lnRef idx="1">
-            <a:schemeClr val="accent1"/>
-          </a:lnRef>
-          <a:fillRef idx="0">
-            <a:schemeClr val="accent1"/>
-          </a:fillRef>
-          <a:effectRef idx="0">
-            <a:schemeClr val="accent1"/>
-          </a:effectRef>
-          <a:fontRef idx="minor">
-            <a:schemeClr val="tx1"/>
-          </a:fontRef>
-        </p:style>
-      </p:cxnSp>
-      <p:cxnSp>
-        <p:nvCxnSpPr>
-          <p:cNvPr id="10" name="Straight Arrow Connector 9"/>
-          <p:cNvCxnSpPr/>
-          <p:nvPr/>
-        </p:nvCxnSpPr>
-        <p:spPr>
           <a:xfrm rot="10800000">
-            <a:off x="5029200" y="5334000"/>
-            <a:ext cx="838200" cy="1588"/>
+            <a:off x="6248400" y="1295400"/>
+            <a:ext cx="533400" cy="1588"/>
           </a:xfrm>
           <a:prstGeom prst="straightConnector1">
             <a:avLst/>
@@ -19870,9 +20035,38 @@
           <a:chExt cx="0" cy="0"/>
         </a:xfrm>
       </p:grpSpPr>
+      <p:sp>
+        <p:nvSpPr>
+          <p:cNvPr id="4" name="TextBox 3"/>
+          <p:cNvSpPr txBox="1"/>
+          <p:nvPr/>
+        </p:nvSpPr>
+        <p:spPr>
+          <a:xfrm>
+            <a:off x="1066800" y="468868"/>
+            <a:ext cx="5818452" cy="369332"/>
+          </a:xfrm>
+          <a:prstGeom prst="rect">
+            <a:avLst/>
+          </a:prstGeom>
+          <a:noFill/>
+        </p:spPr>
+        <p:txBody>
+          <a:bodyPr wrap="none" rtlCol="0">
+            <a:spAutoFit/>
+          </a:bodyPr>
+          <a:lstStyle/>
+          <a:p>
+            <a:r>
+              <a:rPr lang="en-US" dirty="0"/>
+              <a:t>If you have a linear algebra library, PCA is easy to implement</a:t>
+            </a:r>
+          </a:p>
+        </p:txBody>
+      </p:sp>
       <p:pic>
         <p:nvPicPr>
-          <p:cNvPr id="108546" name="Picture 2"/>
+          <p:cNvPr id="103426" name="Picture 2"/>
           <p:cNvPicPr>
             <a:picLocks noChangeAspect="1" noChangeArrowheads="1"/>
           </p:cNvPicPr>
@@ -19887,8 +20081,8 @@
         </p:blipFill>
         <p:spPr bwMode="auto">
           <a:xfrm>
-            <a:off x="152400" y="228600"/>
-            <a:ext cx="7924800" cy="4136253"/>
+            <a:off x="762000" y="1066800"/>
+            <a:ext cx="7239000" cy="4310359"/>
           </a:xfrm>
           <a:prstGeom prst="rect">
             <a:avLst/>
@@ -19902,70 +20096,41 @@
           </a:ln>
         </p:spPr>
       </p:pic>
-      <p:pic>
-        <p:nvPicPr>
-          <p:cNvPr id="108547" name="Picture 3"/>
-          <p:cNvPicPr>
-            <a:picLocks noChangeAspect="1" noChangeArrowheads="1"/>
-          </p:cNvPicPr>
-          <p:nvPr/>
-        </p:nvPicPr>
-        <p:blipFill>
-          <a:blip r:embed="rId4" cstate="print"/>
-          <a:srcRect/>
-          <a:stretch>
-            <a:fillRect/>
-          </a:stretch>
-        </p:blipFill>
-        <p:spPr bwMode="auto">
-          <a:xfrm>
-            <a:off x="457200" y="4495800"/>
-            <a:ext cx="5124450" cy="495300"/>
-          </a:xfrm>
-          <a:prstGeom prst="rect">
-            <a:avLst/>
-          </a:prstGeom>
-          <a:noFill/>
-          <a:ln w="9525">
-            <a:noFill/>
-            <a:miter lim="800000"/>
-            <a:headEnd/>
-            <a:tailEnd/>
-          </a:ln>
-        </p:spPr>
-      </p:pic>
-      <p:pic>
-        <p:nvPicPr>
-          <p:cNvPr id="6" name="Picture 3"/>
-          <p:cNvPicPr>
-            <a:picLocks noChangeAspect="1" noChangeArrowheads="1"/>
-          </p:cNvPicPr>
-          <p:nvPr/>
-        </p:nvPicPr>
-        <p:blipFill>
-          <a:blip r:embed="rId5" cstate="print"/>
-          <a:srcRect/>
-          <a:stretch>
-            <a:fillRect/>
-          </a:stretch>
-        </p:blipFill>
-        <p:spPr bwMode="auto">
-          <a:xfrm>
-            <a:off x="1066800" y="5105400"/>
-            <a:ext cx="5181600" cy="1543050"/>
-          </a:xfrm>
-          <a:prstGeom prst="rect">
-            <a:avLst/>
-          </a:prstGeom>
-          <a:noFill/>
-          <a:ln w="9525">
-            <a:noFill/>
-            <a:miter lim="800000"/>
-            <a:headEnd/>
-            <a:tailEnd/>
-          </a:ln>
-        </p:spPr>
-      </p:pic>
+      <p:sp>
+        <p:nvSpPr>
+          <p:cNvPr id="6" name="TextBox 5"/>
+          <p:cNvSpPr txBox="1"/>
+          <p:nvPr/>
+        </p:nvSpPr>
+        <p:spPr>
+          <a:xfrm>
+            <a:off x="685800" y="5791200"/>
+            <a:ext cx="8106130" cy="646331"/>
+          </a:xfrm>
+          <a:prstGeom prst="rect">
+            <a:avLst/>
+          </a:prstGeom>
+          <a:noFill/>
+        </p:spPr>
+        <p:txBody>
+          <a:bodyPr wrap="none" rtlCol="0">
+            <a:spAutoFit/>
+          </a:bodyPr>
+          <a:lstStyle/>
+          <a:p>
+            <a:r>
+              <a:rPr lang="en-US" dirty="0"/>
+              <a:t>The National Institute of Standards and Technology has been kind enough to provide</a:t>
+            </a:r>
+          </a:p>
+          <a:p>
+            <a:r>
+              <a:rPr lang="en-US" dirty="0"/>
+              <a:t>us with one…</a:t>
+            </a:r>
+          </a:p>
+        </p:txBody>
+      </p:sp>
     </p:spTree>
   </p:cSld>
   <p:clrMapOvr>
@@ -20138,9 +20303,38 @@
           <a:chExt cx="0" cy="0"/>
         </a:xfrm>
       </p:grpSpPr>
+      <p:sp>
+        <p:nvSpPr>
+          <p:cNvPr id="4" name="TextBox 3"/>
+          <p:cNvSpPr txBox="1"/>
+          <p:nvPr/>
+        </p:nvSpPr>
+        <p:spPr>
+          <a:xfrm>
+            <a:off x="1219200" y="381000"/>
+            <a:ext cx="2850780" cy="369332"/>
+          </a:xfrm>
+          <a:prstGeom prst="rect">
+            <a:avLst/>
+          </a:prstGeom>
+          <a:noFill/>
+        </p:spPr>
+        <p:txBody>
+          <a:bodyPr wrap="none" rtlCol="0">
+            <a:spAutoFit/>
+          </a:bodyPr>
+          <a:lstStyle/>
+          <a:p>
+            <a:r>
+              <a:rPr lang="en-US" dirty="0"/>
+              <a:t>1.  Subtract column means…</a:t>
+            </a:r>
+          </a:p>
+        </p:txBody>
+      </p:sp>
       <p:pic>
         <p:nvPicPr>
-          <p:cNvPr id="109570" name="Picture 2"/>
+          <p:cNvPr id="105474" name="Picture 2"/>
           <p:cNvPicPr>
             <a:picLocks noChangeAspect="1" noChangeArrowheads="1"/>
           </p:cNvPicPr>
@@ -20155,8 +20349,8 @@
         </p:blipFill>
         <p:spPr bwMode="auto">
           <a:xfrm>
-            <a:off x="381000" y="304800"/>
-            <a:ext cx="5867400" cy="5193355"/>
+            <a:off x="1066800" y="762000"/>
+            <a:ext cx="5800725" cy="2743200"/>
           </a:xfrm>
           <a:prstGeom prst="rect">
             <a:avLst/>
@@ -20170,39 +20364,6 @@
           </a:ln>
         </p:spPr>
       </p:pic>
-      <p:cxnSp>
-        <p:nvCxnSpPr>
-          <p:cNvPr id="6" name="Straight Arrow Connector 5"/>
-          <p:cNvCxnSpPr/>
-          <p:nvPr/>
-        </p:nvCxnSpPr>
-        <p:spPr>
-          <a:xfrm rot="10800000">
-            <a:off x="2362200" y="5410200"/>
-            <a:ext cx="609600" cy="1588"/>
-          </a:xfrm>
-          <a:prstGeom prst="straightConnector1">
-            <a:avLst/>
-          </a:prstGeom>
-          <a:ln>
-            <a:tailEnd type="arrow"/>
-          </a:ln>
-        </p:spPr>
-        <p:style>
-          <a:lnRef idx="1">
-            <a:schemeClr val="accent1"/>
-          </a:lnRef>
-          <a:fillRef idx="0">
-            <a:schemeClr val="accent1"/>
-          </a:fillRef>
-          <a:effectRef idx="0">
-            <a:schemeClr val="accent1"/>
-          </a:effectRef>
-          <a:fontRef idx="minor">
-            <a:schemeClr val="tx1"/>
-          </a:fontRef>
-        </p:style>
-      </p:cxnSp>
     </p:spTree>
   </p:cSld>
   <p:clrMapOvr>
@@ -20228,9 +20389,38 @@
           <a:chExt cx="0" cy="0"/>
         </a:xfrm>
       </p:grpSpPr>
+      <p:sp>
+        <p:nvSpPr>
+          <p:cNvPr id="4" name="TextBox 3"/>
+          <p:cNvSpPr txBox="1"/>
+          <p:nvPr/>
+        </p:nvSpPr>
+        <p:spPr>
+          <a:xfrm>
+            <a:off x="1219200" y="0"/>
+            <a:ext cx="2949397" cy="369332"/>
+          </a:xfrm>
+          <a:prstGeom prst="rect">
+            <a:avLst/>
+          </a:prstGeom>
+          <a:noFill/>
+        </p:spPr>
+        <p:txBody>
+          <a:bodyPr wrap="none" rtlCol="0">
+            <a:spAutoFit/>
+          </a:bodyPr>
+          <a:lstStyle/>
+          <a:p>
+            <a:r>
+              <a:rPr lang="en-US" dirty="0"/>
+              <a:t>2.  Find the covariance matrix</a:t>
+            </a:r>
+          </a:p>
+        </p:txBody>
+      </p:sp>
       <p:pic>
         <p:nvPicPr>
-          <p:cNvPr id="110594" name="Picture 2"/>
+          <p:cNvPr id="106498" name="Picture 2"/>
           <p:cNvPicPr>
             <a:picLocks noChangeAspect="1" noChangeArrowheads="1"/>
           </p:cNvPicPr>
@@ -20245,8 +20435,8 @@
         </p:blipFill>
         <p:spPr bwMode="auto">
           <a:xfrm>
-            <a:off x="228600" y="5076825"/>
-            <a:ext cx="5762625" cy="1704975"/>
+            <a:off x="228600" y="304800"/>
+            <a:ext cx="5476875" cy="4019550"/>
           </a:xfrm>
           <a:prstGeom prst="rect">
             <a:avLst/>
@@ -20262,7 +20452,7 @@
       </p:pic>
       <p:pic>
         <p:nvPicPr>
-          <p:cNvPr id="110595" name="Picture 3"/>
+          <p:cNvPr id="106499" name="Picture 3"/>
           <p:cNvPicPr>
             <a:picLocks noChangeAspect="1" noChangeArrowheads="1"/>
           </p:cNvPicPr>
@@ -20277,40 +20467,8 @@
         </p:blipFill>
         <p:spPr bwMode="auto">
           <a:xfrm>
-            <a:off x="152400" y="152400"/>
-            <a:ext cx="6934200" cy="2695575"/>
-          </a:xfrm>
-          <a:prstGeom prst="rect">
-            <a:avLst/>
-          </a:prstGeom>
-          <a:noFill/>
-          <a:ln w="9525">
-            <a:noFill/>
-            <a:miter lim="800000"/>
-            <a:headEnd/>
-            <a:tailEnd/>
-          </a:ln>
-        </p:spPr>
-      </p:pic>
-      <p:pic>
-        <p:nvPicPr>
-          <p:cNvPr id="110596" name="Picture 4"/>
-          <p:cNvPicPr>
-            <a:picLocks noChangeAspect="1" noChangeArrowheads="1"/>
-          </p:cNvPicPr>
-          <p:nvPr/>
-        </p:nvPicPr>
-        <p:blipFill>
-          <a:blip r:embed="rId5" cstate="print"/>
-          <a:srcRect/>
-          <a:stretch>
-            <a:fillRect/>
-          </a:stretch>
-        </p:blipFill>
-        <p:spPr bwMode="auto">
-          <a:xfrm>
-            <a:off x="390525" y="2956111"/>
-            <a:ext cx="5934075" cy="1996889"/>
+            <a:off x="3429000" y="3810000"/>
+            <a:ext cx="4648200" cy="2842910"/>
           </a:xfrm>
           <a:prstGeom prst="rect">
             <a:avLst/>
@@ -20351,7 +20509,7 @@
       </p:grpSpPr>
       <p:pic>
         <p:nvPicPr>
-          <p:cNvPr id="112646" name="Picture 6"/>
+          <p:cNvPr id="107522" name="Picture 2"/>
           <p:cNvPicPr>
             <a:picLocks noChangeAspect="1" noChangeArrowheads="1"/>
           </p:cNvPicPr>
@@ -20366,8 +20524,8 @@
         </p:blipFill>
         <p:spPr bwMode="auto">
           <a:xfrm>
-            <a:off x="304800" y="1143000"/>
-            <a:ext cx="7191375" cy="3629025"/>
+            <a:off x="685800" y="1447800"/>
+            <a:ext cx="4248150" cy="2571750"/>
           </a:xfrm>
           <a:prstGeom prst="rect">
             <a:avLst/>
@@ -20383,7 +20541,7 @@
       </p:pic>
       <p:pic>
         <p:nvPicPr>
-          <p:cNvPr id="112643" name="Picture 3"/>
+          <p:cNvPr id="107523" name="Picture 3"/>
           <p:cNvPicPr>
             <a:picLocks noChangeAspect="1" noChangeArrowheads="1"/>
           </p:cNvPicPr>
@@ -20398,8 +20556,8 @@
         </p:blipFill>
         <p:spPr bwMode="auto">
           <a:xfrm>
-            <a:off x="4752975" y="2209800"/>
-            <a:ext cx="4391025" cy="666750"/>
+            <a:off x="457200" y="3962400"/>
+            <a:ext cx="5181600" cy="1543050"/>
           </a:xfrm>
           <a:prstGeom prst="rect">
             <a:avLst/>
@@ -20413,42 +20571,9 @@
           </a:ln>
         </p:spPr>
       </p:pic>
-      <p:cxnSp>
-        <p:nvCxnSpPr>
-          <p:cNvPr id="10" name="Straight Arrow Connector 9"/>
-          <p:cNvCxnSpPr/>
-          <p:nvPr/>
-        </p:nvCxnSpPr>
-        <p:spPr>
-          <a:xfrm flipV="1">
-            <a:off x="4343400" y="2286000"/>
-            <a:ext cx="409575" cy="228599"/>
-          </a:xfrm>
-          <a:prstGeom prst="straightConnector1">
-            <a:avLst/>
-          </a:prstGeom>
-          <a:ln>
-            <a:tailEnd type="arrow"/>
-          </a:ln>
-        </p:spPr>
-        <p:style>
-          <a:lnRef idx="1">
-            <a:schemeClr val="accent1"/>
-          </a:lnRef>
-          <a:fillRef idx="0">
-            <a:schemeClr val="accent1"/>
-          </a:fillRef>
-          <a:effectRef idx="0">
-            <a:schemeClr val="accent1"/>
-          </a:effectRef>
-          <a:fontRef idx="minor">
-            <a:schemeClr val="tx1"/>
-          </a:fontRef>
-        </p:style>
-      </p:cxnSp>
       <p:pic>
         <p:nvPicPr>
-          <p:cNvPr id="112644" name="Picture 4"/>
+          <p:cNvPr id="6" name="Picture 2"/>
           <p:cNvPicPr>
             <a:picLocks noChangeAspect="1" noChangeArrowheads="1"/>
           </p:cNvPicPr>
@@ -20463,8 +20588,8 @@
         </p:blipFill>
         <p:spPr bwMode="auto">
           <a:xfrm>
-            <a:off x="4267200" y="3352800"/>
-            <a:ext cx="4876800" cy="723900"/>
+            <a:off x="4114800" y="457200"/>
+            <a:ext cx="5229225" cy="1266825"/>
           </a:xfrm>
           <a:prstGeom prst="rect">
             <a:avLst/>
@@ -20478,450 +20603,16 @@
           </a:ln>
         </p:spPr>
       </p:pic>
-      <p:pic>
-        <p:nvPicPr>
-          <p:cNvPr id="112645" name="Picture 5"/>
-          <p:cNvPicPr>
-            <a:picLocks noChangeAspect="1" noChangeArrowheads="1"/>
-          </p:cNvPicPr>
-          <p:nvPr/>
-        </p:nvPicPr>
-        <p:blipFill>
-          <a:blip r:embed="rId6" cstate="print"/>
-          <a:srcRect/>
-          <a:stretch>
-            <a:fillRect/>
-          </a:stretch>
-        </p:blipFill>
-        <p:spPr bwMode="auto">
-          <a:xfrm>
-            <a:off x="4800600" y="4953000"/>
-            <a:ext cx="3667125" cy="695325"/>
-          </a:xfrm>
-          <a:prstGeom prst="rect">
-            <a:avLst/>
-          </a:prstGeom>
-          <a:noFill/>
-          <a:ln w="9525">
-            <a:noFill/>
-            <a:miter lim="800000"/>
-            <a:headEnd/>
-            <a:tailEnd/>
-          </a:ln>
-        </p:spPr>
-      </p:pic>
-      <p:pic>
-        <p:nvPicPr>
-          <p:cNvPr id="19" name="Picture 2"/>
-          <p:cNvPicPr>
-            <a:picLocks noChangeAspect="1" noChangeArrowheads="1"/>
-          </p:cNvPicPr>
-          <p:nvPr/>
-        </p:nvPicPr>
-        <p:blipFill>
-          <a:blip r:embed="rId7" cstate="print"/>
-          <a:srcRect/>
-          <a:stretch>
-            <a:fillRect/>
-          </a:stretch>
-        </p:blipFill>
-        <p:spPr bwMode="auto">
-          <a:xfrm>
-            <a:off x="3914775" y="152400"/>
-            <a:ext cx="5229225" cy="1266825"/>
-          </a:xfrm>
-          <a:prstGeom prst="rect">
-            <a:avLst/>
-          </a:prstGeom>
-          <a:noFill/>
-          <a:ln w="9525">
-            <a:noFill/>
-            <a:miter lim="800000"/>
-            <a:headEnd/>
-            <a:tailEnd/>
-          </a:ln>
-        </p:spPr>
-      </p:pic>
       <p:cxnSp>
         <p:nvCxnSpPr>
-          <p:cNvPr id="21" name="Straight Arrow Connector 20"/>
+          <p:cNvPr id="8" name="Straight Arrow Connector 7"/>
           <p:cNvCxnSpPr/>
           <p:nvPr/>
         </p:nvCxnSpPr>
         <p:spPr>
           <a:xfrm flipV="1">
-            <a:off x="3200400" y="1143000"/>
-            <a:ext cx="762000" cy="457200"/>
-          </a:xfrm>
-          <a:prstGeom prst="straightConnector1">
-            <a:avLst/>
-          </a:prstGeom>
-          <a:ln>
-            <a:tailEnd type="arrow"/>
-          </a:ln>
-        </p:spPr>
-        <p:style>
-          <a:lnRef idx="1">
-            <a:schemeClr val="accent1"/>
-          </a:lnRef>
-          <a:fillRef idx="0">
-            <a:schemeClr val="accent1"/>
-          </a:fillRef>
-          <a:effectRef idx="0">
-            <a:schemeClr val="accent1"/>
-          </a:effectRef>
-          <a:fontRef idx="minor">
-            <a:schemeClr val="tx1"/>
-          </a:fontRef>
-        </p:style>
-      </p:cxnSp>
-      <p:sp>
-        <p:nvSpPr>
-          <p:cNvPr id="22" name="TextBox 21"/>
-          <p:cNvSpPr txBox="1"/>
-          <p:nvPr/>
-        </p:nvSpPr>
-        <p:spPr>
-          <a:xfrm>
-            <a:off x="2229517" y="381000"/>
-            <a:ext cx="1428083" cy="369332"/>
-          </a:xfrm>
-          <a:prstGeom prst="rect">
-            <a:avLst/>
-          </a:prstGeom>
-          <a:noFill/>
-        </p:spPr>
-        <p:txBody>
-          <a:bodyPr wrap="none" rtlCol="0">
-            <a:spAutoFit/>
-          </a:bodyPr>
-          <a:lstStyle/>
-          <a:p>
-            <a:r>
-              <a:rPr lang="en-US"/>
-              <a:t>Initial matrix:</a:t>
-            </a:r>
-          </a:p>
-        </p:txBody>
-      </p:sp>
-      <p:sp>
-        <p:nvSpPr>
-          <p:cNvPr id="23" name="TextBox 22"/>
-          <p:cNvSpPr txBox="1"/>
-          <p:nvPr/>
-        </p:nvSpPr>
-        <p:spPr>
-          <a:xfrm>
-            <a:off x="5257800" y="1905000"/>
-            <a:ext cx="1936620" cy="369332"/>
-          </a:xfrm>
-          <a:prstGeom prst="rect">
-            <a:avLst/>
-          </a:prstGeom>
-          <a:noFill/>
-        </p:spPr>
-        <p:txBody>
-          <a:bodyPr wrap="none" rtlCol="0">
-            <a:spAutoFit/>
-          </a:bodyPr>
-          <a:lstStyle/>
-          <a:p>
-            <a:r>
-              <a:rPr lang="en-US" dirty="0"/>
-              <a:t>Covariance matrix:</a:t>
-            </a:r>
-          </a:p>
-        </p:txBody>
-      </p:sp>
-      <p:sp>
-        <p:nvSpPr>
-          <p:cNvPr id="25" name="TextBox 24"/>
-          <p:cNvSpPr txBox="1"/>
-          <p:nvPr/>
-        </p:nvSpPr>
-        <p:spPr>
-          <a:xfrm>
-            <a:off x="5607180" y="3059668"/>
-            <a:ext cx="1487138" cy="369332"/>
-          </a:xfrm>
-          <a:prstGeom prst="rect">
-            <a:avLst/>
-          </a:prstGeom>
-          <a:noFill/>
-        </p:spPr>
-        <p:txBody>
-          <a:bodyPr wrap="none" rtlCol="0">
-            <a:spAutoFit/>
-          </a:bodyPr>
-          <a:lstStyle/>
-          <a:p>
-            <a:r>
-              <a:rPr lang="en-US" dirty="0"/>
-              <a:t>Eigen vectors:</a:t>
-            </a:r>
-          </a:p>
-        </p:txBody>
-      </p:sp>
-      <p:sp>
-        <p:nvSpPr>
-          <p:cNvPr id="26" name="TextBox 25"/>
-          <p:cNvSpPr txBox="1"/>
-          <p:nvPr/>
-        </p:nvSpPr>
-        <p:spPr>
-          <a:xfrm>
-            <a:off x="4114800" y="4724400"/>
-            <a:ext cx="1400833" cy="369332"/>
-          </a:xfrm>
-          <a:prstGeom prst="rect">
-            <a:avLst/>
-          </a:prstGeom>
-          <a:noFill/>
-        </p:spPr>
-        <p:txBody>
-          <a:bodyPr wrap="none" rtlCol="0">
-            <a:spAutoFit/>
-          </a:bodyPr>
-          <a:lstStyle/>
-          <a:p>
-            <a:r>
-              <a:rPr lang="en-US" dirty="0"/>
-              <a:t>Eigen values:</a:t>
-            </a:r>
-          </a:p>
-        </p:txBody>
-      </p:sp>
-      <p:cxnSp>
-        <p:nvCxnSpPr>
-          <p:cNvPr id="28" name="Straight Arrow Connector 27"/>
-          <p:cNvCxnSpPr/>
-          <p:nvPr/>
-        </p:nvCxnSpPr>
-        <p:spPr>
-          <a:xfrm rot="5400000" flipH="1" flipV="1">
-            <a:off x="6667500" y="5676900"/>
-            <a:ext cx="381000" cy="1588"/>
-          </a:xfrm>
-          <a:prstGeom prst="straightConnector1">
-            <a:avLst/>
-          </a:prstGeom>
-          <a:ln>
-            <a:tailEnd type="arrow"/>
-          </a:ln>
-        </p:spPr>
-        <p:style>
-          <a:lnRef idx="1">
-            <a:schemeClr val="accent1"/>
-          </a:lnRef>
-          <a:fillRef idx="0">
-            <a:schemeClr val="accent1"/>
-          </a:fillRef>
-          <a:effectRef idx="0">
-            <a:schemeClr val="accent1"/>
-          </a:effectRef>
-          <a:fontRef idx="minor">
-            <a:schemeClr val="tx1"/>
-          </a:fontRef>
-        </p:style>
-      </p:cxnSp>
-      <p:sp>
-        <p:nvSpPr>
-          <p:cNvPr id="29" name="TextBox 28"/>
-          <p:cNvSpPr txBox="1"/>
-          <p:nvPr/>
-        </p:nvSpPr>
-        <p:spPr>
-          <a:xfrm>
-            <a:off x="4953000" y="5726668"/>
-            <a:ext cx="2154308" cy="369332"/>
-          </a:xfrm>
-          <a:prstGeom prst="rect">
-            <a:avLst/>
-          </a:prstGeom>
-          <a:noFill/>
-        </p:spPr>
-        <p:txBody>
-          <a:bodyPr wrap="none" rtlCol="0">
-            <a:spAutoFit/>
-          </a:bodyPr>
-          <a:lstStyle/>
-          <a:p>
-            <a:r>
-              <a:rPr lang="en-US" dirty="0"/>
-              <a:t>% variance explained</a:t>
-            </a:r>
-          </a:p>
-        </p:txBody>
-      </p:sp>
-      <p:cxnSp>
-        <p:nvCxnSpPr>
-          <p:cNvPr id="31" name="Straight Arrow Connector 30"/>
-          <p:cNvCxnSpPr/>
-          <p:nvPr/>
-        </p:nvCxnSpPr>
-        <p:spPr>
-          <a:xfrm rot="5400000" flipH="1" flipV="1">
-            <a:off x="8039894" y="5752306"/>
-            <a:ext cx="381000" cy="1588"/>
-          </a:xfrm>
-          <a:prstGeom prst="straightConnector1">
-            <a:avLst/>
-          </a:prstGeom>
-          <a:ln>
-            <a:tailEnd type="arrow"/>
-          </a:ln>
-        </p:spPr>
-        <p:style>
-          <a:lnRef idx="1">
-            <a:schemeClr val="accent1"/>
-          </a:lnRef>
-          <a:fillRef idx="0">
-            <a:schemeClr val="accent1"/>
-          </a:fillRef>
-          <a:effectRef idx="0">
-            <a:schemeClr val="accent1"/>
-          </a:effectRef>
-          <a:fontRef idx="minor">
-            <a:schemeClr val="tx1"/>
-          </a:fontRef>
-        </p:style>
-      </p:cxnSp>
-      <p:sp>
-        <p:nvSpPr>
-          <p:cNvPr id="32" name="TextBox 31"/>
-          <p:cNvSpPr txBox="1"/>
-          <p:nvPr/>
-        </p:nvSpPr>
-        <p:spPr>
-          <a:xfrm>
-            <a:off x="7172114" y="5867400"/>
-            <a:ext cx="1971886" cy="646331"/>
-          </a:xfrm>
-          <a:prstGeom prst="rect">
-            <a:avLst/>
-          </a:prstGeom>
-          <a:noFill/>
-        </p:spPr>
-        <p:txBody>
-          <a:bodyPr wrap="none" rtlCol="0">
-            <a:spAutoFit/>
-          </a:bodyPr>
-          <a:lstStyle/>
-          <a:p>
-            <a:r>
-              <a:rPr lang="en-US" dirty="0"/>
-              <a:t>Index in</a:t>
-            </a:r>
-          </a:p>
-          <a:p>
-            <a:r>
-              <a:rPr lang="en-US" dirty="0" err="1"/>
-              <a:t>EigenVector</a:t>
-            </a:r>
-            <a:r>
-              <a:rPr lang="en-US" dirty="0"/>
-              <a:t> Matrix</a:t>
-            </a:r>
-          </a:p>
-        </p:txBody>
-      </p:sp>
-      <p:sp>
-        <p:nvSpPr>
-          <p:cNvPr id="33" name="TextBox 32"/>
-          <p:cNvSpPr txBox="1"/>
-          <p:nvPr/>
-        </p:nvSpPr>
-        <p:spPr>
-          <a:xfrm>
-            <a:off x="5029200" y="3886200"/>
-            <a:ext cx="359394" cy="369332"/>
-          </a:xfrm>
-          <a:prstGeom prst="rect">
-            <a:avLst/>
-          </a:prstGeom>
-          <a:noFill/>
-        </p:spPr>
-        <p:txBody>
-          <a:bodyPr wrap="none" rtlCol="0">
-            <a:spAutoFit/>
-          </a:bodyPr>
-          <a:lstStyle/>
-          <a:p>
-            <a:r>
-              <a:rPr lang="en-US" dirty="0"/>
-              <a:t>,0</a:t>
-            </a:r>
-          </a:p>
-        </p:txBody>
-      </p:sp>
-      <p:sp>
-        <p:nvSpPr>
-          <p:cNvPr id="34" name="TextBox 33"/>
-          <p:cNvSpPr txBox="1"/>
-          <p:nvPr/>
-        </p:nvSpPr>
-        <p:spPr>
-          <a:xfrm>
-            <a:off x="6327714" y="3886200"/>
-            <a:ext cx="359394" cy="369332"/>
-          </a:xfrm>
-          <a:prstGeom prst="rect">
-            <a:avLst/>
-          </a:prstGeom>
-          <a:noFill/>
-        </p:spPr>
-        <p:txBody>
-          <a:bodyPr wrap="none" rtlCol="0">
-            <a:spAutoFit/>
-          </a:bodyPr>
-          <a:lstStyle/>
-          <a:p>
-            <a:r>
-              <a:rPr lang="en-US" dirty="0"/>
-              <a:t>,1</a:t>
-            </a:r>
-          </a:p>
-        </p:txBody>
-      </p:sp>
-      <p:sp>
-        <p:nvSpPr>
-          <p:cNvPr id="35" name="TextBox 34"/>
-          <p:cNvSpPr txBox="1"/>
-          <p:nvPr/>
-        </p:nvSpPr>
-        <p:spPr>
-          <a:xfrm>
-            <a:off x="7699314" y="3886200"/>
-            <a:ext cx="359394" cy="369332"/>
-          </a:xfrm>
-          <a:prstGeom prst="rect">
-            <a:avLst/>
-          </a:prstGeom>
-          <a:noFill/>
-        </p:spPr>
-        <p:txBody>
-          <a:bodyPr wrap="none" rtlCol="0">
-            <a:spAutoFit/>
-          </a:bodyPr>
-          <a:lstStyle/>
-          <a:p>
-            <a:r>
-              <a:rPr lang="en-US" dirty="0"/>
-              <a:t>,2</a:t>
-            </a:r>
-          </a:p>
-        </p:txBody>
-      </p:sp>
-      <p:cxnSp>
-        <p:nvCxnSpPr>
-          <p:cNvPr id="24" name="Straight Arrow Connector 23"/>
-          <p:cNvCxnSpPr/>
-          <p:nvPr/>
-        </p:nvCxnSpPr>
-        <p:spPr>
-          <a:xfrm>
-            <a:off x="3505200" y="2743200"/>
-            <a:ext cx="2133600" cy="381000"/>
+            <a:off x="4191000" y="1447800"/>
+            <a:ext cx="533400" cy="228600"/>
           </a:xfrm>
           <a:prstGeom prst="straightConnector1">
             <a:avLst/>
@@ -20947,14 +20638,14 @@
       </p:cxnSp>
       <p:cxnSp>
         <p:nvCxnSpPr>
-          <p:cNvPr id="30" name="Straight Arrow Connector 29"/>
+          <p:cNvPr id="10" name="Straight Arrow Connector 9"/>
           <p:cNvCxnSpPr/>
           <p:nvPr/>
         </p:nvCxnSpPr>
         <p:spPr>
-          <a:xfrm>
-            <a:off x="3505200" y="4724400"/>
-            <a:ext cx="685800" cy="152400"/>
+          <a:xfrm rot="10800000">
+            <a:off x="5029200" y="5334000"/>
+            <a:ext cx="838200" cy="1588"/>
           </a:xfrm>
           <a:prstGeom prst="straightConnector1">
             <a:avLst/>
@@ -21005,7 +20696,7 @@
       </p:grpSpPr>
       <p:pic>
         <p:nvPicPr>
-          <p:cNvPr id="113666" name="Picture 2"/>
+          <p:cNvPr id="108546" name="Picture 2"/>
           <p:cNvPicPr>
             <a:picLocks noChangeAspect="1" noChangeArrowheads="1"/>
           </p:cNvPicPr>
@@ -21020,8 +20711,8 @@
         </p:blipFill>
         <p:spPr bwMode="auto">
           <a:xfrm>
-            <a:off x="428625" y="1171575"/>
-            <a:ext cx="5133975" cy="4514850"/>
+            <a:off x="152400" y="228600"/>
+            <a:ext cx="7924800" cy="4136253"/>
           </a:xfrm>
           <a:prstGeom prst="rect">
             <a:avLst/>
@@ -21035,38 +20726,9 @@
           </a:ln>
         </p:spPr>
       </p:pic>
-      <p:sp>
-        <p:nvSpPr>
-          <p:cNvPr id="5" name="TextBox 4"/>
-          <p:cNvSpPr txBox="1"/>
-          <p:nvPr/>
-        </p:nvSpPr>
-        <p:spPr>
-          <a:xfrm>
-            <a:off x="3422209" y="1828800"/>
-            <a:ext cx="1378391" cy="369332"/>
-          </a:xfrm>
-          <a:prstGeom prst="rect">
-            <a:avLst/>
-          </a:prstGeom>
-          <a:noFill/>
-        </p:spPr>
-        <p:txBody>
-          <a:bodyPr wrap="none" rtlCol="0">
-            <a:spAutoFit/>
-          </a:bodyPr>
-          <a:lstStyle/>
-          <a:p>
-            <a:r>
-              <a:rPr lang="en-US" dirty="0"/>
-              <a:t>Initial Matrix</a:t>
-            </a:r>
-          </a:p>
-        </p:txBody>
-      </p:sp>
       <p:pic>
         <p:nvPicPr>
-          <p:cNvPr id="6" name="Picture 2"/>
+          <p:cNvPr id="108547" name="Picture 3"/>
           <p:cNvPicPr>
             <a:picLocks noChangeAspect="1" noChangeArrowheads="1"/>
           </p:cNvPicPr>
@@ -21081,8 +20743,8 @@
         </p:blipFill>
         <p:spPr bwMode="auto">
           <a:xfrm>
-            <a:off x="4876800" y="1524000"/>
-            <a:ext cx="4267200" cy="1033766"/>
+            <a:off x="457200" y="4495800"/>
+            <a:ext cx="5124450" cy="495300"/>
           </a:xfrm>
           <a:prstGeom prst="rect">
             <a:avLst/>
@@ -21098,7 +20760,7 @@
       </p:pic>
       <p:pic>
         <p:nvPicPr>
-          <p:cNvPr id="7" name="Picture 4"/>
+          <p:cNvPr id="6" name="Picture 3"/>
           <p:cNvPicPr>
             <a:picLocks noChangeAspect="1" noChangeArrowheads="1"/>
           </p:cNvPicPr>
@@ -21113,8 +20775,8 @@
         </p:blipFill>
         <p:spPr bwMode="auto">
           <a:xfrm>
-            <a:off x="4419600" y="3048000"/>
-            <a:ext cx="4648200" cy="689967"/>
+            <a:off x="1066800" y="5105400"/>
+            <a:ext cx="5181600" cy="1543050"/>
           </a:xfrm>
           <a:prstGeom prst="rect">
             <a:avLst/>
@@ -21128,298 +20790,6 @@
           </a:ln>
         </p:spPr>
       </p:pic>
-      <p:sp>
-        <p:nvSpPr>
-          <p:cNvPr id="8" name="TextBox 7"/>
-          <p:cNvSpPr txBox="1"/>
-          <p:nvPr/>
-        </p:nvSpPr>
-        <p:spPr>
-          <a:xfrm>
-            <a:off x="2362200" y="3048000"/>
-            <a:ext cx="1988750" cy="646331"/>
-          </a:xfrm>
-          <a:prstGeom prst="rect">
-            <a:avLst/>
-          </a:prstGeom>
-          <a:noFill/>
-        </p:spPr>
-        <p:txBody>
-          <a:bodyPr wrap="none" rtlCol="0">
-            <a:spAutoFit/>
-          </a:bodyPr>
-          <a:lstStyle/>
-          <a:p>
-            <a:r>
-              <a:rPr lang="en-US" dirty="0"/>
-              <a:t>Eigen Values</a:t>
-            </a:r>
-          </a:p>
-          <a:p>
-            <a:r>
-              <a:rPr lang="en-US" dirty="0"/>
-              <a:t>(r has them sorted)</a:t>
-            </a:r>
-          </a:p>
-        </p:txBody>
-      </p:sp>
-      <p:pic>
-        <p:nvPicPr>
-          <p:cNvPr id="14" name="Picture 5"/>
-          <p:cNvPicPr>
-            <a:picLocks noChangeAspect="1" noChangeArrowheads="1"/>
-          </p:cNvPicPr>
-          <p:nvPr/>
-        </p:nvPicPr>
-        <p:blipFill>
-          <a:blip r:embed="rId6" cstate="print"/>
-          <a:srcRect/>
-          <a:stretch>
-            <a:fillRect/>
-          </a:stretch>
-        </p:blipFill>
-        <p:spPr bwMode="auto">
-          <a:xfrm>
-            <a:off x="4876800" y="4687669"/>
-            <a:ext cx="3667125" cy="695325"/>
-          </a:xfrm>
-          <a:prstGeom prst="rect">
-            <a:avLst/>
-          </a:prstGeom>
-          <a:noFill/>
-          <a:ln w="9525">
-            <a:noFill/>
-            <a:miter lim="800000"/>
-            <a:headEnd/>
-            <a:tailEnd/>
-          </a:ln>
-        </p:spPr>
-      </p:pic>
-      <p:cxnSp>
-        <p:nvCxnSpPr>
-          <p:cNvPr id="16" name="Straight Arrow Connector 15"/>
-          <p:cNvCxnSpPr/>
-          <p:nvPr/>
-        </p:nvCxnSpPr>
-        <p:spPr>
-          <a:xfrm rot="5400000" flipH="1" flipV="1">
-            <a:off x="6743700" y="5411569"/>
-            <a:ext cx="381000" cy="1588"/>
-          </a:xfrm>
-          <a:prstGeom prst="straightConnector1">
-            <a:avLst/>
-          </a:prstGeom>
-          <a:ln>
-            <a:tailEnd type="arrow"/>
-          </a:ln>
-        </p:spPr>
-        <p:style>
-          <a:lnRef idx="1">
-            <a:schemeClr val="accent1"/>
-          </a:lnRef>
-          <a:fillRef idx="0">
-            <a:schemeClr val="accent1"/>
-          </a:fillRef>
-          <a:effectRef idx="0">
-            <a:schemeClr val="accent1"/>
-          </a:effectRef>
-          <a:fontRef idx="minor">
-            <a:schemeClr val="tx1"/>
-          </a:fontRef>
-        </p:style>
-      </p:cxnSp>
-      <p:sp>
-        <p:nvSpPr>
-          <p:cNvPr id="17" name="TextBox 16"/>
-          <p:cNvSpPr txBox="1"/>
-          <p:nvPr/>
-        </p:nvSpPr>
-        <p:spPr>
-          <a:xfrm>
-            <a:off x="5029200" y="5461337"/>
-            <a:ext cx="2154308" cy="369332"/>
-          </a:xfrm>
-          <a:prstGeom prst="rect">
-            <a:avLst/>
-          </a:prstGeom>
-          <a:noFill/>
-        </p:spPr>
-        <p:txBody>
-          <a:bodyPr wrap="none" rtlCol="0">
-            <a:spAutoFit/>
-          </a:bodyPr>
-          <a:lstStyle/>
-          <a:p>
-            <a:r>
-              <a:rPr lang="en-US" dirty="0"/>
-              <a:t>% variance explained</a:t>
-            </a:r>
-          </a:p>
-        </p:txBody>
-      </p:sp>
-      <p:cxnSp>
-        <p:nvCxnSpPr>
-          <p:cNvPr id="18" name="Straight Arrow Connector 17"/>
-          <p:cNvCxnSpPr/>
-          <p:nvPr/>
-        </p:nvCxnSpPr>
-        <p:spPr>
-          <a:xfrm rot="5400000" flipH="1" flipV="1">
-            <a:off x="8116094" y="5486975"/>
-            <a:ext cx="381000" cy="1588"/>
-          </a:xfrm>
-          <a:prstGeom prst="straightConnector1">
-            <a:avLst/>
-          </a:prstGeom>
-          <a:ln>
-            <a:tailEnd type="arrow"/>
-          </a:ln>
-        </p:spPr>
-        <p:style>
-          <a:lnRef idx="1">
-            <a:schemeClr val="accent1"/>
-          </a:lnRef>
-          <a:fillRef idx="0">
-            <a:schemeClr val="accent1"/>
-          </a:fillRef>
-          <a:effectRef idx="0">
-            <a:schemeClr val="accent1"/>
-          </a:effectRef>
-          <a:fontRef idx="minor">
-            <a:schemeClr val="tx1"/>
-          </a:fontRef>
-        </p:style>
-      </p:cxnSp>
-      <p:sp>
-        <p:nvSpPr>
-          <p:cNvPr id="19" name="TextBox 18"/>
-          <p:cNvSpPr txBox="1"/>
-          <p:nvPr/>
-        </p:nvSpPr>
-        <p:spPr>
-          <a:xfrm>
-            <a:off x="7248314" y="5602069"/>
-            <a:ext cx="1971886" cy="646331"/>
-          </a:xfrm>
-          <a:prstGeom prst="rect">
-            <a:avLst/>
-          </a:prstGeom>
-          <a:noFill/>
-        </p:spPr>
-        <p:txBody>
-          <a:bodyPr wrap="none" rtlCol="0">
-            <a:spAutoFit/>
-          </a:bodyPr>
-          <a:lstStyle/>
-          <a:p>
-            <a:r>
-              <a:rPr lang="en-US" dirty="0"/>
-              <a:t>Index in</a:t>
-            </a:r>
-          </a:p>
-          <a:p>
-            <a:r>
-              <a:rPr lang="en-US" dirty="0" err="1"/>
-              <a:t>EigenVector</a:t>
-            </a:r>
-            <a:r>
-              <a:rPr lang="en-US" dirty="0"/>
-              <a:t> Matrix</a:t>
-            </a:r>
-          </a:p>
-        </p:txBody>
-      </p:sp>
-      <p:cxnSp>
-        <p:nvCxnSpPr>
-          <p:cNvPr id="21" name="Straight Arrow Connector 20"/>
-          <p:cNvCxnSpPr/>
-          <p:nvPr/>
-        </p:nvCxnSpPr>
-        <p:spPr>
-          <a:xfrm rot="10800000">
-            <a:off x="3733800" y="5562600"/>
-            <a:ext cx="1219200" cy="228600"/>
-          </a:xfrm>
-          <a:prstGeom prst="straightConnector1">
-            <a:avLst/>
-          </a:prstGeom>
-          <a:ln>
-            <a:tailEnd type="arrow"/>
-          </a:ln>
-        </p:spPr>
-        <p:style>
-          <a:lnRef idx="1">
-            <a:schemeClr val="accent1"/>
-          </a:lnRef>
-          <a:fillRef idx="0">
-            <a:schemeClr val="accent1"/>
-          </a:fillRef>
-          <a:effectRef idx="0">
-            <a:schemeClr val="accent1"/>
-          </a:effectRef>
-          <a:fontRef idx="minor">
-            <a:schemeClr val="tx1"/>
-          </a:fontRef>
-        </p:style>
-      </p:cxnSp>
-      <p:sp>
-        <p:nvSpPr>
-          <p:cNvPr id="22" name="TextBox 21"/>
-          <p:cNvSpPr txBox="1"/>
-          <p:nvPr/>
-        </p:nvSpPr>
-        <p:spPr>
-          <a:xfrm>
-            <a:off x="1676400" y="762000"/>
-            <a:ext cx="309700" cy="369332"/>
-          </a:xfrm>
-          <a:prstGeom prst="rect">
-            <a:avLst/>
-          </a:prstGeom>
-          <a:noFill/>
-        </p:spPr>
-        <p:txBody>
-          <a:bodyPr wrap="none" rtlCol="0">
-            <a:spAutoFit/>
-          </a:bodyPr>
-          <a:lstStyle/>
-          <a:p>
-            <a:r>
-              <a:rPr lang="en-US" dirty="0"/>
-              <a:t>R</a:t>
-            </a:r>
-          </a:p>
-        </p:txBody>
-      </p:sp>
-      <p:sp>
-        <p:nvSpPr>
-          <p:cNvPr id="23" name="TextBox 22"/>
-          <p:cNvSpPr txBox="1"/>
-          <p:nvPr/>
-        </p:nvSpPr>
-        <p:spPr>
-          <a:xfrm>
-            <a:off x="6019800" y="697468"/>
-            <a:ext cx="631135" cy="369332"/>
-          </a:xfrm>
-          <a:prstGeom prst="rect">
-            <a:avLst/>
-          </a:prstGeom>
-          <a:noFill/>
-        </p:spPr>
-        <p:txBody>
-          <a:bodyPr wrap="none" rtlCol="0">
-            <a:spAutoFit/>
-          </a:bodyPr>
-          <a:lstStyle/>
-          <a:p>
-            <a:r>
-              <a:rPr lang="en-US" dirty="0"/>
-              <a:t>JAVA</a:t>
-            </a:r>
-          </a:p>
-        </p:txBody>
-      </p:sp>
     </p:spTree>
   </p:cSld>
   <p:clrMapOvr>
@@ -21445,46 +20815,9 @@
           <a:chExt cx="0" cy="0"/>
         </a:xfrm>
       </p:grpSpPr>
-      <p:sp>
-        <p:nvSpPr>
-          <p:cNvPr id="4" name="TextBox 3"/>
-          <p:cNvSpPr txBox="1"/>
-          <p:nvPr/>
-        </p:nvSpPr>
-        <p:spPr>
-          <a:xfrm>
-            <a:off x="1143000" y="76200"/>
-            <a:ext cx="5867953" cy="369332"/>
-          </a:xfrm>
-          <a:prstGeom prst="rect">
-            <a:avLst/>
-          </a:prstGeom>
-          <a:noFill/>
-        </p:spPr>
-        <p:txBody>
-          <a:bodyPr wrap="none" rtlCol="0">
-            <a:spAutoFit/>
-          </a:bodyPr>
-          <a:lstStyle/>
-          <a:p>
-            <a:r>
-              <a:rPr lang="en-US" dirty="0"/>
-              <a:t>One more trivial helper method to reorder the </a:t>
-            </a:r>
-            <a:r>
-              <a:rPr lang="en-US" dirty="0" err="1"/>
-              <a:t>eigenvalues</a:t>
-            </a:r>
-            <a:r>
-              <a:rPr lang="en-US" dirty="0"/>
-              <a:t>…</a:t>
-            </a:r>
-          </a:p>
-        </p:txBody>
-      </p:sp>
       <p:pic>
         <p:nvPicPr>
-          <p:cNvPr id="115714" name="Picture 2"/>
+          <p:cNvPr id="109570" name="Picture 2"/>
           <p:cNvPicPr>
             <a:picLocks noChangeAspect="1" noChangeArrowheads="1"/>
           </p:cNvPicPr>
@@ -21499,8 +20832,8 @@
         </p:blipFill>
         <p:spPr bwMode="auto">
           <a:xfrm>
-            <a:off x="228600" y="609600"/>
-            <a:ext cx="8486775" cy="3695700"/>
+            <a:off x="381000" y="304800"/>
+            <a:ext cx="5867400" cy="5193355"/>
           </a:xfrm>
           <a:prstGeom prst="rect">
             <a:avLst/>
@@ -21514,229 +20847,16 @@
           </a:ln>
         </p:spPr>
       </p:pic>
-      <p:sp>
-        <p:nvSpPr>
-          <p:cNvPr id="6" name="TextBox 5"/>
-          <p:cNvSpPr txBox="1"/>
-          <p:nvPr/>
-        </p:nvSpPr>
-        <p:spPr>
-          <a:xfrm>
-            <a:off x="609600" y="4572000"/>
-            <a:ext cx="532518" cy="369332"/>
-          </a:xfrm>
-          <a:prstGeom prst="rect">
-            <a:avLst/>
-          </a:prstGeom>
-          <a:noFill/>
-        </p:spPr>
-        <p:txBody>
-          <a:bodyPr wrap="none" rtlCol="0">
-            <a:spAutoFit/>
-          </a:bodyPr>
-          <a:lstStyle/>
-          <a:p>
-            <a:r>
-              <a:rPr lang="en-US" dirty="0"/>
-              <a:t>In:  </a:t>
-            </a:r>
-          </a:p>
-        </p:txBody>
-      </p:sp>
-      <p:pic>
-        <p:nvPicPr>
-          <p:cNvPr id="7" name="Picture 4"/>
-          <p:cNvPicPr>
-            <a:picLocks noChangeAspect="1" noChangeArrowheads="1"/>
-          </p:cNvPicPr>
-          <p:nvPr/>
-        </p:nvPicPr>
-        <p:blipFill>
-          <a:blip r:embed="rId4" cstate="print"/>
-          <a:srcRect/>
-          <a:stretch>
-            <a:fillRect/>
-          </a:stretch>
-        </p:blipFill>
-        <p:spPr bwMode="auto">
-          <a:xfrm>
-            <a:off x="1143000" y="4495800"/>
-            <a:ext cx="4648200" cy="689967"/>
-          </a:xfrm>
-          <a:prstGeom prst="rect">
-            <a:avLst/>
-          </a:prstGeom>
-          <a:noFill/>
-          <a:ln w="9525">
-            <a:noFill/>
-            <a:miter lim="800000"/>
-            <a:headEnd/>
-            <a:tailEnd/>
-          </a:ln>
-        </p:spPr>
-      </p:pic>
-      <p:sp>
-        <p:nvSpPr>
-          <p:cNvPr id="9" name="TextBox 8"/>
-          <p:cNvSpPr txBox="1"/>
-          <p:nvPr/>
-        </p:nvSpPr>
-        <p:spPr>
-          <a:xfrm>
-            <a:off x="438961" y="5574268"/>
-            <a:ext cx="704039" cy="369332"/>
-          </a:xfrm>
-          <a:prstGeom prst="rect">
-            <a:avLst/>
-          </a:prstGeom>
-          <a:noFill/>
-        </p:spPr>
-        <p:txBody>
-          <a:bodyPr wrap="none" rtlCol="0">
-            <a:spAutoFit/>
-          </a:bodyPr>
-          <a:lstStyle/>
-          <a:p>
-            <a:r>
-              <a:rPr lang="en-US"/>
-              <a:t>Out:  </a:t>
-            </a:r>
-            <a:endParaRPr lang="en-US" dirty="0"/>
-          </a:p>
-        </p:txBody>
-      </p:sp>
-      <p:pic>
-        <p:nvPicPr>
-          <p:cNvPr id="115715" name="Picture 3"/>
-          <p:cNvPicPr>
-            <a:picLocks noChangeAspect="1" noChangeArrowheads="1"/>
-          </p:cNvPicPr>
-          <p:nvPr/>
-        </p:nvPicPr>
-        <p:blipFill>
-          <a:blip r:embed="rId5" cstate="print"/>
-          <a:srcRect/>
-          <a:stretch>
-            <a:fillRect/>
-          </a:stretch>
-        </p:blipFill>
-        <p:spPr bwMode="auto">
-          <a:xfrm>
-            <a:off x="1066800" y="5562600"/>
-            <a:ext cx="4581525" cy="666750"/>
-          </a:xfrm>
-          <a:prstGeom prst="rect">
-            <a:avLst/>
-          </a:prstGeom>
-          <a:noFill/>
-          <a:ln w="9525">
-            <a:noFill/>
-            <a:miter lim="800000"/>
-            <a:headEnd/>
-            <a:tailEnd/>
-          </a:ln>
-        </p:spPr>
-      </p:pic>
-      <p:pic>
-        <p:nvPicPr>
-          <p:cNvPr id="11" name="Picture 5"/>
-          <p:cNvPicPr>
-            <a:picLocks noChangeAspect="1" noChangeArrowheads="1"/>
-          </p:cNvPicPr>
-          <p:nvPr/>
-        </p:nvPicPr>
-        <p:blipFill>
-          <a:blip r:embed="rId6" cstate="print"/>
-          <a:srcRect/>
-          <a:stretch>
-            <a:fillRect/>
-          </a:stretch>
-        </p:blipFill>
-        <p:spPr bwMode="auto">
-          <a:xfrm>
-            <a:off x="5867400" y="4495800"/>
-            <a:ext cx="3048000" cy="577932"/>
-          </a:xfrm>
-          <a:prstGeom prst="rect">
-            <a:avLst/>
-          </a:prstGeom>
-          <a:noFill/>
-          <a:ln w="9525">
-            <a:noFill/>
-            <a:miter lim="800000"/>
-            <a:headEnd/>
-            <a:tailEnd/>
-          </a:ln>
-        </p:spPr>
-      </p:pic>
-      <p:sp>
-        <p:nvSpPr>
-          <p:cNvPr id="14" name="TextBox 13"/>
-          <p:cNvSpPr txBox="1"/>
-          <p:nvPr/>
-        </p:nvSpPr>
-        <p:spPr>
-          <a:xfrm>
-            <a:off x="1524000" y="4202668"/>
-            <a:ext cx="2368277" cy="369332"/>
-          </a:xfrm>
-          <a:prstGeom prst="rect">
-            <a:avLst/>
-          </a:prstGeom>
-          <a:noFill/>
-        </p:spPr>
-        <p:txBody>
-          <a:bodyPr wrap="none" rtlCol="0">
-            <a:spAutoFit/>
-          </a:bodyPr>
-          <a:lstStyle/>
-          <a:p>
-            <a:r>
-              <a:rPr lang="en-US" dirty="0"/>
-              <a:t>Unsorted Eigen Vectors</a:t>
-            </a:r>
-          </a:p>
-        </p:txBody>
-      </p:sp>
-      <p:sp>
-        <p:nvSpPr>
-          <p:cNvPr id="15" name="TextBox 14"/>
-          <p:cNvSpPr txBox="1"/>
-          <p:nvPr/>
-        </p:nvSpPr>
-        <p:spPr>
-          <a:xfrm>
-            <a:off x="6024961" y="4114800"/>
-            <a:ext cx="2028504" cy="369332"/>
-          </a:xfrm>
-          <a:prstGeom prst="rect">
-            <a:avLst/>
-          </a:prstGeom>
-          <a:noFill/>
-        </p:spPr>
-        <p:txBody>
-          <a:bodyPr wrap="none" rtlCol="0">
-            <a:spAutoFit/>
-          </a:bodyPr>
-          <a:lstStyle/>
-          <a:p>
-            <a:r>
-              <a:rPr lang="en-US" dirty="0"/>
-              <a:t>Sorted Eigen Values</a:t>
-            </a:r>
-          </a:p>
-        </p:txBody>
-      </p:sp>
       <p:cxnSp>
         <p:nvCxnSpPr>
-          <p:cNvPr id="17" name="Straight Arrow Connector 16"/>
+          <p:cNvPr id="6" name="Straight Arrow Connector 5"/>
           <p:cNvCxnSpPr/>
           <p:nvPr/>
         </p:nvCxnSpPr>
         <p:spPr>
-          <a:xfrm rot="5400000" flipH="1" flipV="1">
-            <a:off x="6057900" y="5143500"/>
-            <a:ext cx="381000" cy="1588"/>
+          <a:xfrm rot="10800000">
+            <a:off x="2362200" y="5410200"/>
+            <a:ext cx="609600" cy="1588"/>
           </a:xfrm>
           <a:prstGeom prst="straightConnector1">
             <a:avLst/>
@@ -21760,45 +20880,226 @@
           </a:fontRef>
         </p:style>
       </p:cxnSp>
-      <p:sp>
-        <p:nvSpPr>
-          <p:cNvPr id="18" name="TextBox 17"/>
-          <p:cNvSpPr txBox="1"/>
-          <p:nvPr/>
-        </p:nvSpPr>
-        <p:spPr>
-          <a:xfrm>
-            <a:off x="5791200" y="5181600"/>
-            <a:ext cx="1248547" cy="369332"/>
-          </a:xfrm>
-          <a:prstGeom prst="rect">
-            <a:avLst/>
-          </a:prstGeom>
-          <a:noFill/>
-        </p:spPr>
-        <p:txBody>
-          <a:bodyPr wrap="none" rtlCol="0">
-            <a:spAutoFit/>
-          </a:bodyPr>
-          <a:lstStyle/>
-          <a:p>
-            <a:r>
-              <a:rPr lang="en-US" dirty="0"/>
-              <a:t>Eigen value</a:t>
-            </a:r>
-          </a:p>
-        </p:txBody>
-      </p:sp>
+    </p:spTree>
+  </p:cSld>
+  <p:clrMapOvr>
+    <a:masterClrMapping/>
+  </p:clrMapOvr>
+</p:sld>
+</file>
+
+<file path=ppt/slides/slide65.xml><?xml version="1.0" encoding="utf-8"?>
+<p:sld xmlns:a="http://schemas.openxmlformats.org/drawingml/2006/main" xmlns:r="http://schemas.openxmlformats.org/officeDocument/2006/relationships" xmlns:p="http://schemas.openxmlformats.org/presentationml/2006/main">
+  <p:cSld>
+    <p:spTree>
+      <p:nvGrpSpPr>
+        <p:cNvPr id="1" name=""/>
+        <p:cNvGrpSpPr/>
+        <p:nvPr/>
+      </p:nvGrpSpPr>
+      <p:grpSpPr>
+        <a:xfrm>
+          <a:off x="0" y="0"/>
+          <a:ext cx="0" cy="0"/>
+          <a:chOff x="0" y="0"/>
+          <a:chExt cx="0" cy="0"/>
+        </a:xfrm>
+      </p:grpSpPr>
+      <p:pic>
+        <p:nvPicPr>
+          <p:cNvPr id="110594" name="Picture 2"/>
+          <p:cNvPicPr>
+            <a:picLocks noChangeAspect="1" noChangeArrowheads="1"/>
+          </p:cNvPicPr>
+          <p:nvPr/>
+        </p:nvPicPr>
+        <p:blipFill>
+          <a:blip r:embed="rId3" cstate="print"/>
+          <a:srcRect/>
+          <a:stretch>
+            <a:fillRect/>
+          </a:stretch>
+        </p:blipFill>
+        <p:spPr bwMode="auto">
+          <a:xfrm>
+            <a:off x="228600" y="5076825"/>
+            <a:ext cx="5762625" cy="1704975"/>
+          </a:xfrm>
+          <a:prstGeom prst="rect">
+            <a:avLst/>
+          </a:prstGeom>
+          <a:noFill/>
+          <a:ln w="9525">
+            <a:noFill/>
+            <a:miter lim="800000"/>
+            <a:headEnd/>
+            <a:tailEnd/>
+          </a:ln>
+        </p:spPr>
+      </p:pic>
+      <p:pic>
+        <p:nvPicPr>
+          <p:cNvPr id="110595" name="Picture 3"/>
+          <p:cNvPicPr>
+            <a:picLocks noChangeAspect="1" noChangeArrowheads="1"/>
+          </p:cNvPicPr>
+          <p:nvPr/>
+        </p:nvPicPr>
+        <p:blipFill>
+          <a:blip r:embed="rId4" cstate="print"/>
+          <a:srcRect/>
+          <a:stretch>
+            <a:fillRect/>
+          </a:stretch>
+        </p:blipFill>
+        <p:spPr bwMode="auto">
+          <a:xfrm>
+            <a:off x="152400" y="152400"/>
+            <a:ext cx="6934200" cy="2695575"/>
+          </a:xfrm>
+          <a:prstGeom prst="rect">
+            <a:avLst/>
+          </a:prstGeom>
+          <a:noFill/>
+          <a:ln w="9525">
+            <a:noFill/>
+            <a:miter lim="800000"/>
+            <a:headEnd/>
+            <a:tailEnd/>
+          </a:ln>
+        </p:spPr>
+      </p:pic>
+      <p:pic>
+        <p:nvPicPr>
+          <p:cNvPr id="110596" name="Picture 4"/>
+          <p:cNvPicPr>
+            <a:picLocks noChangeAspect="1" noChangeArrowheads="1"/>
+          </p:cNvPicPr>
+          <p:nvPr/>
+        </p:nvPicPr>
+        <p:blipFill>
+          <a:blip r:embed="rId5" cstate="print"/>
+          <a:srcRect/>
+          <a:stretch>
+            <a:fillRect/>
+          </a:stretch>
+        </p:blipFill>
+        <p:spPr bwMode="auto">
+          <a:xfrm>
+            <a:off x="390525" y="2956111"/>
+            <a:ext cx="5934075" cy="1996889"/>
+          </a:xfrm>
+          <a:prstGeom prst="rect">
+            <a:avLst/>
+          </a:prstGeom>
+          <a:noFill/>
+          <a:ln w="9525">
+            <a:noFill/>
+            <a:miter lim="800000"/>
+            <a:headEnd/>
+            <a:tailEnd/>
+          </a:ln>
+        </p:spPr>
+      </p:pic>
+    </p:spTree>
+  </p:cSld>
+  <p:clrMapOvr>
+    <a:masterClrMapping/>
+  </p:clrMapOvr>
+</p:sld>
+</file>
+
+<file path=ppt/slides/slide66.xml><?xml version="1.0" encoding="utf-8"?>
+<p:sld xmlns:a="http://schemas.openxmlformats.org/drawingml/2006/main" xmlns:r="http://schemas.openxmlformats.org/officeDocument/2006/relationships" xmlns:p="http://schemas.openxmlformats.org/presentationml/2006/main">
+  <p:cSld>
+    <p:spTree>
+      <p:nvGrpSpPr>
+        <p:cNvPr id="1" name=""/>
+        <p:cNvGrpSpPr/>
+        <p:nvPr/>
+      </p:nvGrpSpPr>
+      <p:grpSpPr>
+        <a:xfrm>
+          <a:off x="0" y="0"/>
+          <a:ext cx="0" cy="0"/>
+          <a:chOff x="0" y="0"/>
+          <a:chExt cx="0" cy="0"/>
+        </a:xfrm>
+      </p:grpSpPr>
+      <p:pic>
+        <p:nvPicPr>
+          <p:cNvPr id="112646" name="Picture 6"/>
+          <p:cNvPicPr>
+            <a:picLocks noChangeAspect="1" noChangeArrowheads="1"/>
+          </p:cNvPicPr>
+          <p:nvPr/>
+        </p:nvPicPr>
+        <p:blipFill>
+          <a:blip r:embed="rId3" cstate="print"/>
+          <a:srcRect/>
+          <a:stretch>
+            <a:fillRect/>
+          </a:stretch>
+        </p:blipFill>
+        <p:spPr bwMode="auto">
+          <a:xfrm>
+            <a:off x="304800" y="1143000"/>
+            <a:ext cx="7191375" cy="3629025"/>
+          </a:xfrm>
+          <a:prstGeom prst="rect">
+            <a:avLst/>
+          </a:prstGeom>
+          <a:noFill/>
+          <a:ln w="9525">
+            <a:noFill/>
+            <a:miter lim="800000"/>
+            <a:headEnd/>
+            <a:tailEnd/>
+          </a:ln>
+        </p:spPr>
+      </p:pic>
+      <p:pic>
+        <p:nvPicPr>
+          <p:cNvPr id="112643" name="Picture 3"/>
+          <p:cNvPicPr>
+            <a:picLocks noChangeAspect="1" noChangeArrowheads="1"/>
+          </p:cNvPicPr>
+          <p:nvPr/>
+        </p:nvPicPr>
+        <p:blipFill>
+          <a:blip r:embed="rId4" cstate="print"/>
+          <a:srcRect/>
+          <a:stretch>
+            <a:fillRect/>
+          </a:stretch>
+        </p:blipFill>
+        <p:spPr bwMode="auto">
+          <a:xfrm>
+            <a:off x="4752975" y="2209800"/>
+            <a:ext cx="4391025" cy="666750"/>
+          </a:xfrm>
+          <a:prstGeom prst="rect">
+            <a:avLst/>
+          </a:prstGeom>
+          <a:noFill/>
+          <a:ln w="9525">
+            <a:noFill/>
+            <a:miter lim="800000"/>
+            <a:headEnd/>
+            <a:tailEnd/>
+          </a:ln>
+        </p:spPr>
+      </p:pic>
       <p:cxnSp>
         <p:nvCxnSpPr>
-          <p:cNvPr id="20" name="Straight Arrow Connector 19"/>
+          <p:cNvPr id="10" name="Straight Arrow Connector 9"/>
           <p:cNvCxnSpPr/>
           <p:nvPr/>
         </p:nvCxnSpPr>
         <p:spPr>
-          <a:xfrm rot="5400000" flipH="1" flipV="1">
-            <a:off x="8497094" y="5142706"/>
-            <a:ext cx="381000" cy="1588"/>
+          <a:xfrm flipV="1">
+            <a:off x="4343400" y="2286000"/>
+            <a:ext cx="409575" cy="228599"/>
           </a:xfrm>
           <a:prstGeom prst="straightConnector1">
             <a:avLst/>
@@ -21822,6 +21123,135 @@
           </a:fontRef>
         </p:style>
       </p:cxnSp>
+      <p:pic>
+        <p:nvPicPr>
+          <p:cNvPr id="112644" name="Picture 4"/>
+          <p:cNvPicPr>
+            <a:picLocks noChangeAspect="1" noChangeArrowheads="1"/>
+          </p:cNvPicPr>
+          <p:nvPr/>
+        </p:nvPicPr>
+        <p:blipFill>
+          <a:blip r:embed="rId5" cstate="print"/>
+          <a:srcRect/>
+          <a:stretch>
+            <a:fillRect/>
+          </a:stretch>
+        </p:blipFill>
+        <p:spPr bwMode="auto">
+          <a:xfrm>
+            <a:off x="4267200" y="3352800"/>
+            <a:ext cx="4876800" cy="723900"/>
+          </a:xfrm>
+          <a:prstGeom prst="rect">
+            <a:avLst/>
+          </a:prstGeom>
+          <a:noFill/>
+          <a:ln w="9525">
+            <a:noFill/>
+            <a:miter lim="800000"/>
+            <a:headEnd/>
+            <a:tailEnd/>
+          </a:ln>
+        </p:spPr>
+      </p:pic>
+      <p:pic>
+        <p:nvPicPr>
+          <p:cNvPr id="112645" name="Picture 5"/>
+          <p:cNvPicPr>
+            <a:picLocks noChangeAspect="1" noChangeArrowheads="1"/>
+          </p:cNvPicPr>
+          <p:nvPr/>
+        </p:nvPicPr>
+        <p:blipFill>
+          <a:blip r:embed="rId6" cstate="print"/>
+          <a:srcRect/>
+          <a:stretch>
+            <a:fillRect/>
+          </a:stretch>
+        </p:blipFill>
+        <p:spPr bwMode="auto">
+          <a:xfrm>
+            <a:off x="4800600" y="4953000"/>
+            <a:ext cx="3667125" cy="695325"/>
+          </a:xfrm>
+          <a:prstGeom prst="rect">
+            <a:avLst/>
+          </a:prstGeom>
+          <a:noFill/>
+          <a:ln w="9525">
+            <a:noFill/>
+            <a:miter lim="800000"/>
+            <a:headEnd/>
+            <a:tailEnd/>
+          </a:ln>
+        </p:spPr>
+      </p:pic>
+      <p:pic>
+        <p:nvPicPr>
+          <p:cNvPr id="19" name="Picture 2"/>
+          <p:cNvPicPr>
+            <a:picLocks noChangeAspect="1" noChangeArrowheads="1"/>
+          </p:cNvPicPr>
+          <p:nvPr/>
+        </p:nvPicPr>
+        <p:blipFill>
+          <a:blip r:embed="rId7" cstate="print"/>
+          <a:srcRect/>
+          <a:stretch>
+            <a:fillRect/>
+          </a:stretch>
+        </p:blipFill>
+        <p:spPr bwMode="auto">
+          <a:xfrm>
+            <a:off x="3914775" y="152400"/>
+            <a:ext cx="5229225" cy="1266825"/>
+          </a:xfrm>
+          <a:prstGeom prst="rect">
+            <a:avLst/>
+          </a:prstGeom>
+          <a:noFill/>
+          <a:ln w="9525">
+            <a:noFill/>
+            <a:miter lim="800000"/>
+            <a:headEnd/>
+            <a:tailEnd/>
+          </a:ln>
+        </p:spPr>
+      </p:pic>
+      <p:cxnSp>
+        <p:nvCxnSpPr>
+          <p:cNvPr id="21" name="Straight Arrow Connector 20"/>
+          <p:cNvCxnSpPr/>
+          <p:nvPr/>
+        </p:nvCxnSpPr>
+        <p:spPr>
+          <a:xfrm flipV="1">
+            <a:off x="3200400" y="1143000"/>
+            <a:ext cx="762000" cy="457200"/>
+          </a:xfrm>
+          <a:prstGeom prst="straightConnector1">
+            <a:avLst/>
+          </a:prstGeom>
+          <a:ln>
+            <a:tailEnd type="arrow"/>
+          </a:ln>
+        </p:spPr>
+        <p:style>
+          <a:lnRef idx="1">
+            <a:schemeClr val="accent1"/>
+          </a:lnRef>
+          <a:fillRef idx="0">
+            <a:schemeClr val="accent1"/>
+          </a:fillRef>
+          <a:effectRef idx="0">
+            <a:schemeClr val="accent1"/>
+          </a:effectRef>
+          <a:fontRef idx="minor">
+            <a:schemeClr val="tx1"/>
+          </a:fontRef>
+        </p:style>
+      </p:cxnSp>
       <p:sp>
         <p:nvSpPr>
           <p:cNvPr id="22" name="TextBox 21"/>
@@ -21830,8 +21260,8 @@
         </p:nvSpPr>
         <p:spPr>
           <a:xfrm>
-            <a:off x="8218030" y="5181600"/>
-            <a:ext cx="697370" cy="369332"/>
+            <a:off x="2229517" y="381000"/>
+            <a:ext cx="1428083" cy="369332"/>
           </a:xfrm>
           <a:prstGeom prst="rect">
             <a:avLst/>
@@ -21845,8 +21275,8 @@
           <a:lstStyle/>
           <a:p>
             <a:r>
-              <a:rPr lang="en-US" dirty="0"/>
-              <a:t>Index</a:t>
+              <a:rPr lang="en-US"/>
+              <a:t>Initial matrix:</a:t>
             </a:r>
           </a:p>
         </p:txBody>
@@ -21859,8 +21289,8 @@
         </p:nvSpPr>
         <p:spPr>
           <a:xfrm>
-            <a:off x="1138297" y="6183868"/>
-            <a:ext cx="2062103" cy="369332"/>
+            <a:off x="5257800" y="1905000"/>
+            <a:ext cx="1936620" cy="369332"/>
           </a:xfrm>
           <a:prstGeom prst="rect">
             <a:avLst/>
@@ -21875,16 +21305,356 @@
           <a:p>
             <a:r>
               <a:rPr lang="en-US" dirty="0"/>
-              <a:t>Sorted </a:t>
-            </a:r>
+              <a:t>Covariance matrix:</a:t>
+            </a:r>
+          </a:p>
+        </p:txBody>
+      </p:sp>
+      <p:sp>
+        <p:nvSpPr>
+          <p:cNvPr id="25" name="TextBox 24"/>
+          <p:cNvSpPr txBox="1"/>
+          <p:nvPr/>
+        </p:nvSpPr>
+        <p:spPr>
+          <a:xfrm>
+            <a:off x="5607180" y="3059668"/>
+            <a:ext cx="1487138" cy="369332"/>
+          </a:xfrm>
+          <a:prstGeom prst="rect">
+            <a:avLst/>
+          </a:prstGeom>
+          <a:noFill/>
+        </p:spPr>
+        <p:txBody>
+          <a:bodyPr wrap="none" rtlCol="0">
+            <a:spAutoFit/>
+          </a:bodyPr>
+          <a:lstStyle/>
+          <a:p>
+            <a:r>
+              <a:rPr lang="en-US" dirty="0"/>
+              <a:t>Eigen vectors:</a:t>
+            </a:r>
+          </a:p>
+        </p:txBody>
+      </p:sp>
+      <p:sp>
+        <p:nvSpPr>
+          <p:cNvPr id="26" name="TextBox 25"/>
+          <p:cNvSpPr txBox="1"/>
+          <p:nvPr/>
+        </p:nvSpPr>
+        <p:spPr>
+          <a:xfrm>
+            <a:off x="4114800" y="4724400"/>
+            <a:ext cx="1400833" cy="369332"/>
+          </a:xfrm>
+          <a:prstGeom prst="rect">
+            <a:avLst/>
+          </a:prstGeom>
+          <a:noFill/>
+        </p:spPr>
+        <p:txBody>
+          <a:bodyPr wrap="none" rtlCol="0">
+            <a:spAutoFit/>
+          </a:bodyPr>
+          <a:lstStyle/>
+          <a:p>
+            <a:r>
+              <a:rPr lang="en-US" dirty="0"/>
+              <a:t>Eigen values:</a:t>
+            </a:r>
+          </a:p>
+        </p:txBody>
+      </p:sp>
+      <p:cxnSp>
+        <p:nvCxnSpPr>
+          <p:cNvPr id="28" name="Straight Arrow Connector 27"/>
+          <p:cNvCxnSpPr/>
+          <p:nvPr/>
+        </p:nvCxnSpPr>
+        <p:spPr>
+          <a:xfrm rot="5400000" flipH="1" flipV="1">
+            <a:off x="6667500" y="5676900"/>
+            <a:ext cx="381000" cy="1588"/>
+          </a:xfrm>
+          <a:prstGeom prst="straightConnector1">
+            <a:avLst/>
+          </a:prstGeom>
+          <a:ln>
+            <a:tailEnd type="arrow"/>
+          </a:ln>
+        </p:spPr>
+        <p:style>
+          <a:lnRef idx="1">
+            <a:schemeClr val="accent1"/>
+          </a:lnRef>
+          <a:fillRef idx="0">
+            <a:schemeClr val="accent1"/>
+          </a:fillRef>
+          <a:effectRef idx="0">
+            <a:schemeClr val="accent1"/>
+          </a:effectRef>
+          <a:fontRef idx="minor">
+            <a:schemeClr val="tx1"/>
+          </a:fontRef>
+        </p:style>
+      </p:cxnSp>
+      <p:sp>
+        <p:nvSpPr>
+          <p:cNvPr id="29" name="TextBox 28"/>
+          <p:cNvSpPr txBox="1"/>
+          <p:nvPr/>
+        </p:nvSpPr>
+        <p:spPr>
+          <a:xfrm>
+            <a:off x="4953000" y="5726668"/>
+            <a:ext cx="2154308" cy="369332"/>
+          </a:xfrm>
+          <a:prstGeom prst="rect">
+            <a:avLst/>
+          </a:prstGeom>
+          <a:noFill/>
+        </p:spPr>
+        <p:txBody>
+          <a:bodyPr wrap="none" rtlCol="0">
+            <a:spAutoFit/>
+          </a:bodyPr>
+          <a:lstStyle/>
+          <a:p>
+            <a:r>
+              <a:rPr lang="en-US" dirty="0"/>
+              <a:t>% variance explained</a:t>
+            </a:r>
+          </a:p>
+        </p:txBody>
+      </p:sp>
+      <p:cxnSp>
+        <p:nvCxnSpPr>
+          <p:cNvPr id="31" name="Straight Arrow Connector 30"/>
+          <p:cNvCxnSpPr/>
+          <p:nvPr/>
+        </p:nvCxnSpPr>
+        <p:spPr>
+          <a:xfrm rot="5400000" flipH="1" flipV="1">
+            <a:off x="8039894" y="5752306"/>
+            <a:ext cx="381000" cy="1588"/>
+          </a:xfrm>
+          <a:prstGeom prst="straightConnector1">
+            <a:avLst/>
+          </a:prstGeom>
+          <a:ln>
+            <a:tailEnd type="arrow"/>
+          </a:ln>
+        </p:spPr>
+        <p:style>
+          <a:lnRef idx="1">
+            <a:schemeClr val="accent1"/>
+          </a:lnRef>
+          <a:fillRef idx="0">
+            <a:schemeClr val="accent1"/>
+          </a:fillRef>
+          <a:effectRef idx="0">
+            <a:schemeClr val="accent1"/>
+          </a:effectRef>
+          <a:fontRef idx="minor">
+            <a:schemeClr val="tx1"/>
+          </a:fontRef>
+        </p:style>
+      </p:cxnSp>
+      <p:sp>
+        <p:nvSpPr>
+          <p:cNvPr id="32" name="TextBox 31"/>
+          <p:cNvSpPr txBox="1"/>
+          <p:nvPr/>
+        </p:nvSpPr>
+        <p:spPr>
+          <a:xfrm>
+            <a:off x="7172114" y="5867400"/>
+            <a:ext cx="1971886" cy="646331"/>
+          </a:xfrm>
+          <a:prstGeom prst="rect">
+            <a:avLst/>
+          </a:prstGeom>
+          <a:noFill/>
+        </p:spPr>
+        <p:txBody>
+          <a:bodyPr wrap="none" rtlCol="0">
+            <a:spAutoFit/>
+          </a:bodyPr>
+          <a:lstStyle/>
+          <a:p>
+            <a:r>
+              <a:rPr lang="en-US" dirty="0"/>
+              <a:t>Index in</a:t>
+            </a:r>
+          </a:p>
+          <a:p>
             <a:r>
               <a:rPr lang="en-US" dirty="0" err="1"/>
-              <a:t>EigenVectors</a:t>
-            </a:r>
-            <a:endParaRPr lang="en-US" dirty="0"/>
-          </a:p>
-        </p:txBody>
-      </p:sp>
+              <a:t>EigenVector</a:t>
+            </a:r>
+            <a:r>
+              <a:rPr lang="en-US" dirty="0"/>
+              <a:t> Matrix</a:t>
+            </a:r>
+          </a:p>
+        </p:txBody>
+      </p:sp>
+      <p:sp>
+        <p:nvSpPr>
+          <p:cNvPr id="33" name="TextBox 32"/>
+          <p:cNvSpPr txBox="1"/>
+          <p:nvPr/>
+        </p:nvSpPr>
+        <p:spPr>
+          <a:xfrm>
+            <a:off x="5029200" y="3886200"/>
+            <a:ext cx="359394" cy="369332"/>
+          </a:xfrm>
+          <a:prstGeom prst="rect">
+            <a:avLst/>
+          </a:prstGeom>
+          <a:noFill/>
+        </p:spPr>
+        <p:txBody>
+          <a:bodyPr wrap="none" rtlCol="0">
+            <a:spAutoFit/>
+          </a:bodyPr>
+          <a:lstStyle/>
+          <a:p>
+            <a:r>
+              <a:rPr lang="en-US" dirty="0"/>
+              <a:t>,0</a:t>
+            </a:r>
+          </a:p>
+        </p:txBody>
+      </p:sp>
+      <p:sp>
+        <p:nvSpPr>
+          <p:cNvPr id="34" name="TextBox 33"/>
+          <p:cNvSpPr txBox="1"/>
+          <p:nvPr/>
+        </p:nvSpPr>
+        <p:spPr>
+          <a:xfrm>
+            <a:off x="6327714" y="3886200"/>
+            <a:ext cx="359394" cy="369332"/>
+          </a:xfrm>
+          <a:prstGeom prst="rect">
+            <a:avLst/>
+          </a:prstGeom>
+          <a:noFill/>
+        </p:spPr>
+        <p:txBody>
+          <a:bodyPr wrap="none" rtlCol="0">
+            <a:spAutoFit/>
+          </a:bodyPr>
+          <a:lstStyle/>
+          <a:p>
+            <a:r>
+              <a:rPr lang="en-US" dirty="0"/>
+              <a:t>,1</a:t>
+            </a:r>
+          </a:p>
+        </p:txBody>
+      </p:sp>
+      <p:sp>
+        <p:nvSpPr>
+          <p:cNvPr id="35" name="TextBox 34"/>
+          <p:cNvSpPr txBox="1"/>
+          <p:nvPr/>
+        </p:nvSpPr>
+        <p:spPr>
+          <a:xfrm>
+            <a:off x="7699314" y="3886200"/>
+            <a:ext cx="359394" cy="369332"/>
+          </a:xfrm>
+          <a:prstGeom prst="rect">
+            <a:avLst/>
+          </a:prstGeom>
+          <a:noFill/>
+        </p:spPr>
+        <p:txBody>
+          <a:bodyPr wrap="none" rtlCol="0">
+            <a:spAutoFit/>
+          </a:bodyPr>
+          <a:lstStyle/>
+          <a:p>
+            <a:r>
+              <a:rPr lang="en-US" dirty="0"/>
+              <a:t>,2</a:t>
+            </a:r>
+          </a:p>
+        </p:txBody>
+      </p:sp>
+      <p:cxnSp>
+        <p:nvCxnSpPr>
+          <p:cNvPr id="24" name="Straight Arrow Connector 23"/>
+          <p:cNvCxnSpPr/>
+          <p:nvPr/>
+        </p:nvCxnSpPr>
+        <p:spPr>
+          <a:xfrm>
+            <a:off x="3505200" y="2743200"/>
+            <a:ext cx="2133600" cy="381000"/>
+          </a:xfrm>
+          <a:prstGeom prst="straightConnector1">
+            <a:avLst/>
+          </a:prstGeom>
+          <a:ln>
+            <a:tailEnd type="arrow"/>
+          </a:ln>
+        </p:spPr>
+        <p:style>
+          <a:lnRef idx="1">
+            <a:schemeClr val="accent1"/>
+          </a:lnRef>
+          <a:fillRef idx="0">
+            <a:schemeClr val="accent1"/>
+          </a:fillRef>
+          <a:effectRef idx="0">
+            <a:schemeClr val="accent1"/>
+          </a:effectRef>
+          <a:fontRef idx="minor">
+            <a:schemeClr val="tx1"/>
+          </a:fontRef>
+        </p:style>
+      </p:cxnSp>
+      <p:cxnSp>
+        <p:nvCxnSpPr>
+          <p:cNvPr id="30" name="Straight Arrow Connector 29"/>
+          <p:cNvCxnSpPr/>
+          <p:nvPr/>
+        </p:nvCxnSpPr>
+        <p:spPr>
+          <a:xfrm>
+            <a:off x="3505200" y="4724400"/>
+            <a:ext cx="685800" cy="152400"/>
+          </a:xfrm>
+          <a:prstGeom prst="straightConnector1">
+            <a:avLst/>
+          </a:prstGeom>
+          <a:ln>
+            <a:tailEnd type="arrow"/>
+          </a:ln>
+        </p:spPr>
+        <p:style>
+          <a:lnRef idx="1">
+            <a:schemeClr val="accent1"/>
+          </a:lnRef>
+          <a:fillRef idx="0">
+            <a:schemeClr val="accent1"/>
+          </a:fillRef>
+          <a:effectRef idx="0">
+            <a:schemeClr val="accent1"/>
+          </a:effectRef>
+          <a:fontRef idx="minor">
+            <a:schemeClr val="tx1"/>
+          </a:fontRef>
+        </p:style>
+      </p:cxnSp>
     </p:spTree>
   </p:cSld>
   <p:clrMapOvr>
@@ -21893,7 +21663,914 @@
 </p:sld>
 </file>
 
-<file path=ppt/slides/slide65.xml><?xml version="1.0" encoding="utf-8"?>
+<file path=ppt/slides/slide67.xml><?xml version="1.0" encoding="utf-8"?>
+<p:sld xmlns:a="http://schemas.openxmlformats.org/drawingml/2006/main" xmlns:r="http://schemas.openxmlformats.org/officeDocument/2006/relationships" xmlns:p="http://schemas.openxmlformats.org/presentationml/2006/main">
+  <p:cSld>
+    <p:spTree>
+      <p:nvGrpSpPr>
+        <p:cNvPr id="1" name=""/>
+        <p:cNvGrpSpPr/>
+        <p:nvPr/>
+      </p:nvGrpSpPr>
+      <p:grpSpPr>
+        <a:xfrm>
+          <a:off x="0" y="0"/>
+          <a:ext cx="0" cy="0"/>
+          <a:chOff x="0" y="0"/>
+          <a:chExt cx="0" cy="0"/>
+        </a:xfrm>
+      </p:grpSpPr>
+      <p:pic>
+        <p:nvPicPr>
+          <p:cNvPr id="113666" name="Picture 2"/>
+          <p:cNvPicPr>
+            <a:picLocks noChangeAspect="1" noChangeArrowheads="1"/>
+          </p:cNvPicPr>
+          <p:nvPr/>
+        </p:nvPicPr>
+        <p:blipFill>
+          <a:blip r:embed="rId3" cstate="print"/>
+          <a:srcRect/>
+          <a:stretch>
+            <a:fillRect/>
+          </a:stretch>
+        </p:blipFill>
+        <p:spPr bwMode="auto">
+          <a:xfrm>
+            <a:off x="428625" y="1171575"/>
+            <a:ext cx="5133975" cy="4514850"/>
+          </a:xfrm>
+          <a:prstGeom prst="rect">
+            <a:avLst/>
+          </a:prstGeom>
+          <a:noFill/>
+          <a:ln w="9525">
+            <a:noFill/>
+            <a:miter lim="800000"/>
+            <a:headEnd/>
+            <a:tailEnd/>
+          </a:ln>
+        </p:spPr>
+      </p:pic>
+      <p:sp>
+        <p:nvSpPr>
+          <p:cNvPr id="5" name="TextBox 4"/>
+          <p:cNvSpPr txBox="1"/>
+          <p:nvPr/>
+        </p:nvSpPr>
+        <p:spPr>
+          <a:xfrm>
+            <a:off x="3422209" y="1828800"/>
+            <a:ext cx="1378391" cy="369332"/>
+          </a:xfrm>
+          <a:prstGeom prst="rect">
+            <a:avLst/>
+          </a:prstGeom>
+          <a:noFill/>
+        </p:spPr>
+        <p:txBody>
+          <a:bodyPr wrap="none" rtlCol="0">
+            <a:spAutoFit/>
+          </a:bodyPr>
+          <a:lstStyle/>
+          <a:p>
+            <a:r>
+              <a:rPr lang="en-US" dirty="0"/>
+              <a:t>Initial Matrix</a:t>
+            </a:r>
+          </a:p>
+        </p:txBody>
+      </p:sp>
+      <p:pic>
+        <p:nvPicPr>
+          <p:cNvPr id="6" name="Picture 2"/>
+          <p:cNvPicPr>
+            <a:picLocks noChangeAspect="1" noChangeArrowheads="1"/>
+          </p:cNvPicPr>
+          <p:nvPr/>
+        </p:nvPicPr>
+        <p:blipFill>
+          <a:blip r:embed="rId4" cstate="print"/>
+          <a:srcRect/>
+          <a:stretch>
+            <a:fillRect/>
+          </a:stretch>
+        </p:blipFill>
+        <p:spPr bwMode="auto">
+          <a:xfrm>
+            <a:off x="4876800" y="1524000"/>
+            <a:ext cx="4267200" cy="1033766"/>
+          </a:xfrm>
+          <a:prstGeom prst="rect">
+            <a:avLst/>
+          </a:prstGeom>
+          <a:noFill/>
+          <a:ln w="9525">
+            <a:noFill/>
+            <a:miter lim="800000"/>
+            <a:headEnd/>
+            <a:tailEnd/>
+          </a:ln>
+        </p:spPr>
+      </p:pic>
+      <p:pic>
+        <p:nvPicPr>
+          <p:cNvPr id="7" name="Picture 4"/>
+          <p:cNvPicPr>
+            <a:picLocks noChangeAspect="1" noChangeArrowheads="1"/>
+          </p:cNvPicPr>
+          <p:nvPr/>
+        </p:nvPicPr>
+        <p:blipFill>
+          <a:blip r:embed="rId5" cstate="print"/>
+          <a:srcRect/>
+          <a:stretch>
+            <a:fillRect/>
+          </a:stretch>
+        </p:blipFill>
+        <p:spPr bwMode="auto">
+          <a:xfrm>
+            <a:off x="4419600" y="3048000"/>
+            <a:ext cx="4648200" cy="689967"/>
+          </a:xfrm>
+          <a:prstGeom prst="rect">
+            <a:avLst/>
+          </a:prstGeom>
+          <a:noFill/>
+          <a:ln w="9525">
+            <a:noFill/>
+            <a:miter lim="800000"/>
+            <a:headEnd/>
+            <a:tailEnd/>
+          </a:ln>
+        </p:spPr>
+      </p:pic>
+      <p:sp>
+        <p:nvSpPr>
+          <p:cNvPr id="8" name="TextBox 7"/>
+          <p:cNvSpPr txBox="1"/>
+          <p:nvPr/>
+        </p:nvSpPr>
+        <p:spPr>
+          <a:xfrm>
+            <a:off x="2362200" y="3048000"/>
+            <a:ext cx="1988750" cy="646331"/>
+          </a:xfrm>
+          <a:prstGeom prst="rect">
+            <a:avLst/>
+          </a:prstGeom>
+          <a:noFill/>
+        </p:spPr>
+        <p:txBody>
+          <a:bodyPr wrap="none" rtlCol="0">
+            <a:spAutoFit/>
+          </a:bodyPr>
+          <a:lstStyle/>
+          <a:p>
+            <a:r>
+              <a:rPr lang="en-US" dirty="0"/>
+              <a:t>Eigen Values</a:t>
+            </a:r>
+          </a:p>
+          <a:p>
+            <a:r>
+              <a:rPr lang="en-US" dirty="0"/>
+              <a:t>(r has them sorted)</a:t>
+            </a:r>
+          </a:p>
+        </p:txBody>
+      </p:sp>
+      <p:pic>
+        <p:nvPicPr>
+          <p:cNvPr id="14" name="Picture 5"/>
+          <p:cNvPicPr>
+            <a:picLocks noChangeAspect="1" noChangeArrowheads="1"/>
+          </p:cNvPicPr>
+          <p:nvPr/>
+        </p:nvPicPr>
+        <p:blipFill>
+          <a:blip r:embed="rId6" cstate="print"/>
+          <a:srcRect/>
+          <a:stretch>
+            <a:fillRect/>
+          </a:stretch>
+        </p:blipFill>
+        <p:spPr bwMode="auto">
+          <a:xfrm>
+            <a:off x="4876800" y="4687669"/>
+            <a:ext cx="3667125" cy="695325"/>
+          </a:xfrm>
+          <a:prstGeom prst="rect">
+            <a:avLst/>
+          </a:prstGeom>
+          <a:noFill/>
+          <a:ln w="9525">
+            <a:noFill/>
+            <a:miter lim="800000"/>
+            <a:headEnd/>
+            <a:tailEnd/>
+          </a:ln>
+        </p:spPr>
+      </p:pic>
+      <p:cxnSp>
+        <p:nvCxnSpPr>
+          <p:cNvPr id="16" name="Straight Arrow Connector 15"/>
+          <p:cNvCxnSpPr/>
+          <p:nvPr/>
+        </p:nvCxnSpPr>
+        <p:spPr>
+          <a:xfrm rot="5400000" flipH="1" flipV="1">
+            <a:off x="6743700" y="5411569"/>
+            <a:ext cx="381000" cy="1588"/>
+          </a:xfrm>
+          <a:prstGeom prst="straightConnector1">
+            <a:avLst/>
+          </a:prstGeom>
+          <a:ln>
+            <a:tailEnd type="arrow"/>
+          </a:ln>
+        </p:spPr>
+        <p:style>
+          <a:lnRef idx="1">
+            <a:schemeClr val="accent1"/>
+          </a:lnRef>
+          <a:fillRef idx="0">
+            <a:schemeClr val="accent1"/>
+          </a:fillRef>
+          <a:effectRef idx="0">
+            <a:schemeClr val="accent1"/>
+          </a:effectRef>
+          <a:fontRef idx="minor">
+            <a:schemeClr val="tx1"/>
+          </a:fontRef>
+        </p:style>
+      </p:cxnSp>
+      <p:sp>
+        <p:nvSpPr>
+          <p:cNvPr id="17" name="TextBox 16"/>
+          <p:cNvSpPr txBox="1"/>
+          <p:nvPr/>
+        </p:nvSpPr>
+        <p:spPr>
+          <a:xfrm>
+            <a:off x="5029200" y="5461337"/>
+            <a:ext cx="2154308" cy="369332"/>
+          </a:xfrm>
+          <a:prstGeom prst="rect">
+            <a:avLst/>
+          </a:prstGeom>
+          <a:noFill/>
+        </p:spPr>
+        <p:txBody>
+          <a:bodyPr wrap="none" rtlCol="0">
+            <a:spAutoFit/>
+          </a:bodyPr>
+          <a:lstStyle/>
+          <a:p>
+            <a:r>
+              <a:rPr lang="en-US" dirty="0"/>
+              <a:t>% variance explained</a:t>
+            </a:r>
+          </a:p>
+        </p:txBody>
+      </p:sp>
+      <p:cxnSp>
+        <p:nvCxnSpPr>
+          <p:cNvPr id="18" name="Straight Arrow Connector 17"/>
+          <p:cNvCxnSpPr/>
+          <p:nvPr/>
+        </p:nvCxnSpPr>
+        <p:spPr>
+          <a:xfrm rot="5400000" flipH="1" flipV="1">
+            <a:off x="8116094" y="5486975"/>
+            <a:ext cx="381000" cy="1588"/>
+          </a:xfrm>
+          <a:prstGeom prst="straightConnector1">
+            <a:avLst/>
+          </a:prstGeom>
+          <a:ln>
+            <a:tailEnd type="arrow"/>
+          </a:ln>
+        </p:spPr>
+        <p:style>
+          <a:lnRef idx="1">
+            <a:schemeClr val="accent1"/>
+          </a:lnRef>
+          <a:fillRef idx="0">
+            <a:schemeClr val="accent1"/>
+          </a:fillRef>
+          <a:effectRef idx="0">
+            <a:schemeClr val="accent1"/>
+          </a:effectRef>
+          <a:fontRef idx="minor">
+            <a:schemeClr val="tx1"/>
+          </a:fontRef>
+        </p:style>
+      </p:cxnSp>
+      <p:sp>
+        <p:nvSpPr>
+          <p:cNvPr id="19" name="TextBox 18"/>
+          <p:cNvSpPr txBox="1"/>
+          <p:nvPr/>
+        </p:nvSpPr>
+        <p:spPr>
+          <a:xfrm>
+            <a:off x="7248314" y="5602069"/>
+            <a:ext cx="1971886" cy="646331"/>
+          </a:xfrm>
+          <a:prstGeom prst="rect">
+            <a:avLst/>
+          </a:prstGeom>
+          <a:noFill/>
+        </p:spPr>
+        <p:txBody>
+          <a:bodyPr wrap="none" rtlCol="0">
+            <a:spAutoFit/>
+          </a:bodyPr>
+          <a:lstStyle/>
+          <a:p>
+            <a:r>
+              <a:rPr lang="en-US" dirty="0"/>
+              <a:t>Index in</a:t>
+            </a:r>
+          </a:p>
+          <a:p>
+            <a:r>
+              <a:rPr lang="en-US" dirty="0" err="1"/>
+              <a:t>EigenVector</a:t>
+            </a:r>
+            <a:r>
+              <a:rPr lang="en-US" dirty="0"/>
+              <a:t> Matrix</a:t>
+            </a:r>
+          </a:p>
+        </p:txBody>
+      </p:sp>
+      <p:cxnSp>
+        <p:nvCxnSpPr>
+          <p:cNvPr id="21" name="Straight Arrow Connector 20"/>
+          <p:cNvCxnSpPr/>
+          <p:nvPr/>
+        </p:nvCxnSpPr>
+        <p:spPr>
+          <a:xfrm rot="10800000">
+            <a:off x="3733800" y="5562600"/>
+            <a:ext cx="1219200" cy="228600"/>
+          </a:xfrm>
+          <a:prstGeom prst="straightConnector1">
+            <a:avLst/>
+          </a:prstGeom>
+          <a:ln>
+            <a:tailEnd type="arrow"/>
+          </a:ln>
+        </p:spPr>
+        <p:style>
+          <a:lnRef idx="1">
+            <a:schemeClr val="accent1"/>
+          </a:lnRef>
+          <a:fillRef idx="0">
+            <a:schemeClr val="accent1"/>
+          </a:fillRef>
+          <a:effectRef idx="0">
+            <a:schemeClr val="accent1"/>
+          </a:effectRef>
+          <a:fontRef idx="minor">
+            <a:schemeClr val="tx1"/>
+          </a:fontRef>
+        </p:style>
+      </p:cxnSp>
+      <p:sp>
+        <p:nvSpPr>
+          <p:cNvPr id="22" name="TextBox 21"/>
+          <p:cNvSpPr txBox="1"/>
+          <p:nvPr/>
+        </p:nvSpPr>
+        <p:spPr>
+          <a:xfrm>
+            <a:off x="1676400" y="762000"/>
+            <a:ext cx="309700" cy="369332"/>
+          </a:xfrm>
+          <a:prstGeom prst="rect">
+            <a:avLst/>
+          </a:prstGeom>
+          <a:noFill/>
+        </p:spPr>
+        <p:txBody>
+          <a:bodyPr wrap="none" rtlCol="0">
+            <a:spAutoFit/>
+          </a:bodyPr>
+          <a:lstStyle/>
+          <a:p>
+            <a:r>
+              <a:rPr lang="en-US" dirty="0"/>
+              <a:t>R</a:t>
+            </a:r>
+          </a:p>
+        </p:txBody>
+      </p:sp>
+      <p:sp>
+        <p:nvSpPr>
+          <p:cNvPr id="23" name="TextBox 22"/>
+          <p:cNvSpPr txBox="1"/>
+          <p:nvPr/>
+        </p:nvSpPr>
+        <p:spPr>
+          <a:xfrm>
+            <a:off x="6019800" y="697468"/>
+            <a:ext cx="631135" cy="369332"/>
+          </a:xfrm>
+          <a:prstGeom prst="rect">
+            <a:avLst/>
+          </a:prstGeom>
+          <a:noFill/>
+        </p:spPr>
+        <p:txBody>
+          <a:bodyPr wrap="none" rtlCol="0">
+            <a:spAutoFit/>
+          </a:bodyPr>
+          <a:lstStyle/>
+          <a:p>
+            <a:r>
+              <a:rPr lang="en-US" dirty="0"/>
+              <a:t>JAVA</a:t>
+            </a:r>
+          </a:p>
+        </p:txBody>
+      </p:sp>
+    </p:spTree>
+  </p:cSld>
+  <p:clrMapOvr>
+    <a:masterClrMapping/>
+  </p:clrMapOvr>
+</p:sld>
+</file>
+
+<file path=ppt/slides/slide68.xml><?xml version="1.0" encoding="utf-8"?>
+<p:sld xmlns:a="http://schemas.openxmlformats.org/drawingml/2006/main" xmlns:r="http://schemas.openxmlformats.org/officeDocument/2006/relationships" xmlns:p="http://schemas.openxmlformats.org/presentationml/2006/main">
+  <p:cSld>
+    <p:spTree>
+      <p:nvGrpSpPr>
+        <p:cNvPr id="1" name=""/>
+        <p:cNvGrpSpPr/>
+        <p:nvPr/>
+      </p:nvGrpSpPr>
+      <p:grpSpPr>
+        <a:xfrm>
+          <a:off x="0" y="0"/>
+          <a:ext cx="0" cy="0"/>
+          <a:chOff x="0" y="0"/>
+          <a:chExt cx="0" cy="0"/>
+        </a:xfrm>
+      </p:grpSpPr>
+      <p:sp>
+        <p:nvSpPr>
+          <p:cNvPr id="4" name="TextBox 3"/>
+          <p:cNvSpPr txBox="1"/>
+          <p:nvPr/>
+        </p:nvSpPr>
+        <p:spPr>
+          <a:xfrm>
+            <a:off x="1143000" y="76200"/>
+            <a:ext cx="5867953" cy="369332"/>
+          </a:xfrm>
+          <a:prstGeom prst="rect">
+            <a:avLst/>
+          </a:prstGeom>
+          <a:noFill/>
+        </p:spPr>
+        <p:txBody>
+          <a:bodyPr wrap="none" rtlCol="0">
+            <a:spAutoFit/>
+          </a:bodyPr>
+          <a:lstStyle/>
+          <a:p>
+            <a:r>
+              <a:rPr lang="en-US" dirty="0"/>
+              <a:t>One more trivial helper method to reorder the </a:t>
+            </a:r>
+            <a:r>
+              <a:rPr lang="en-US" dirty="0" err="1"/>
+              <a:t>eigenvalues</a:t>
+            </a:r>
+            <a:r>
+              <a:rPr lang="en-US" dirty="0"/>
+              <a:t>…</a:t>
+            </a:r>
+          </a:p>
+        </p:txBody>
+      </p:sp>
+      <p:pic>
+        <p:nvPicPr>
+          <p:cNvPr id="115714" name="Picture 2"/>
+          <p:cNvPicPr>
+            <a:picLocks noChangeAspect="1" noChangeArrowheads="1"/>
+          </p:cNvPicPr>
+          <p:nvPr/>
+        </p:nvPicPr>
+        <p:blipFill>
+          <a:blip r:embed="rId3" cstate="print"/>
+          <a:srcRect/>
+          <a:stretch>
+            <a:fillRect/>
+          </a:stretch>
+        </p:blipFill>
+        <p:spPr bwMode="auto">
+          <a:xfrm>
+            <a:off x="228600" y="609600"/>
+            <a:ext cx="8486775" cy="3695700"/>
+          </a:xfrm>
+          <a:prstGeom prst="rect">
+            <a:avLst/>
+          </a:prstGeom>
+          <a:noFill/>
+          <a:ln w="9525">
+            <a:noFill/>
+            <a:miter lim="800000"/>
+            <a:headEnd/>
+            <a:tailEnd/>
+          </a:ln>
+        </p:spPr>
+      </p:pic>
+      <p:sp>
+        <p:nvSpPr>
+          <p:cNvPr id="6" name="TextBox 5"/>
+          <p:cNvSpPr txBox="1"/>
+          <p:nvPr/>
+        </p:nvSpPr>
+        <p:spPr>
+          <a:xfrm>
+            <a:off x="609600" y="4572000"/>
+            <a:ext cx="532518" cy="369332"/>
+          </a:xfrm>
+          <a:prstGeom prst="rect">
+            <a:avLst/>
+          </a:prstGeom>
+          <a:noFill/>
+        </p:spPr>
+        <p:txBody>
+          <a:bodyPr wrap="none" rtlCol="0">
+            <a:spAutoFit/>
+          </a:bodyPr>
+          <a:lstStyle/>
+          <a:p>
+            <a:r>
+              <a:rPr lang="en-US" dirty="0"/>
+              <a:t>In:  </a:t>
+            </a:r>
+          </a:p>
+        </p:txBody>
+      </p:sp>
+      <p:pic>
+        <p:nvPicPr>
+          <p:cNvPr id="7" name="Picture 4"/>
+          <p:cNvPicPr>
+            <a:picLocks noChangeAspect="1" noChangeArrowheads="1"/>
+          </p:cNvPicPr>
+          <p:nvPr/>
+        </p:nvPicPr>
+        <p:blipFill>
+          <a:blip r:embed="rId4" cstate="print"/>
+          <a:srcRect/>
+          <a:stretch>
+            <a:fillRect/>
+          </a:stretch>
+        </p:blipFill>
+        <p:spPr bwMode="auto">
+          <a:xfrm>
+            <a:off x="1143000" y="4495800"/>
+            <a:ext cx="4648200" cy="689967"/>
+          </a:xfrm>
+          <a:prstGeom prst="rect">
+            <a:avLst/>
+          </a:prstGeom>
+          <a:noFill/>
+          <a:ln w="9525">
+            <a:noFill/>
+            <a:miter lim="800000"/>
+            <a:headEnd/>
+            <a:tailEnd/>
+          </a:ln>
+        </p:spPr>
+      </p:pic>
+      <p:sp>
+        <p:nvSpPr>
+          <p:cNvPr id="9" name="TextBox 8"/>
+          <p:cNvSpPr txBox="1"/>
+          <p:nvPr/>
+        </p:nvSpPr>
+        <p:spPr>
+          <a:xfrm>
+            <a:off x="438961" y="5574268"/>
+            <a:ext cx="704039" cy="369332"/>
+          </a:xfrm>
+          <a:prstGeom prst="rect">
+            <a:avLst/>
+          </a:prstGeom>
+          <a:noFill/>
+        </p:spPr>
+        <p:txBody>
+          <a:bodyPr wrap="none" rtlCol="0">
+            <a:spAutoFit/>
+          </a:bodyPr>
+          <a:lstStyle/>
+          <a:p>
+            <a:r>
+              <a:rPr lang="en-US"/>
+              <a:t>Out:  </a:t>
+            </a:r>
+            <a:endParaRPr lang="en-US" dirty="0"/>
+          </a:p>
+        </p:txBody>
+      </p:sp>
+      <p:pic>
+        <p:nvPicPr>
+          <p:cNvPr id="115715" name="Picture 3"/>
+          <p:cNvPicPr>
+            <a:picLocks noChangeAspect="1" noChangeArrowheads="1"/>
+          </p:cNvPicPr>
+          <p:nvPr/>
+        </p:nvPicPr>
+        <p:blipFill>
+          <a:blip r:embed="rId5" cstate="print"/>
+          <a:srcRect/>
+          <a:stretch>
+            <a:fillRect/>
+          </a:stretch>
+        </p:blipFill>
+        <p:spPr bwMode="auto">
+          <a:xfrm>
+            <a:off x="1066800" y="5562600"/>
+            <a:ext cx="4581525" cy="666750"/>
+          </a:xfrm>
+          <a:prstGeom prst="rect">
+            <a:avLst/>
+          </a:prstGeom>
+          <a:noFill/>
+          <a:ln w="9525">
+            <a:noFill/>
+            <a:miter lim="800000"/>
+            <a:headEnd/>
+            <a:tailEnd/>
+          </a:ln>
+        </p:spPr>
+      </p:pic>
+      <p:pic>
+        <p:nvPicPr>
+          <p:cNvPr id="11" name="Picture 5"/>
+          <p:cNvPicPr>
+            <a:picLocks noChangeAspect="1" noChangeArrowheads="1"/>
+          </p:cNvPicPr>
+          <p:nvPr/>
+        </p:nvPicPr>
+        <p:blipFill>
+          <a:blip r:embed="rId6" cstate="print"/>
+          <a:srcRect/>
+          <a:stretch>
+            <a:fillRect/>
+          </a:stretch>
+        </p:blipFill>
+        <p:spPr bwMode="auto">
+          <a:xfrm>
+            <a:off x="5867400" y="4495800"/>
+            <a:ext cx="3048000" cy="577932"/>
+          </a:xfrm>
+          <a:prstGeom prst="rect">
+            <a:avLst/>
+          </a:prstGeom>
+          <a:noFill/>
+          <a:ln w="9525">
+            <a:noFill/>
+            <a:miter lim="800000"/>
+            <a:headEnd/>
+            <a:tailEnd/>
+          </a:ln>
+        </p:spPr>
+      </p:pic>
+      <p:sp>
+        <p:nvSpPr>
+          <p:cNvPr id="14" name="TextBox 13"/>
+          <p:cNvSpPr txBox="1"/>
+          <p:nvPr/>
+        </p:nvSpPr>
+        <p:spPr>
+          <a:xfrm>
+            <a:off x="1524000" y="4202668"/>
+            <a:ext cx="2368277" cy="369332"/>
+          </a:xfrm>
+          <a:prstGeom prst="rect">
+            <a:avLst/>
+          </a:prstGeom>
+          <a:noFill/>
+        </p:spPr>
+        <p:txBody>
+          <a:bodyPr wrap="none" rtlCol="0">
+            <a:spAutoFit/>
+          </a:bodyPr>
+          <a:lstStyle/>
+          <a:p>
+            <a:r>
+              <a:rPr lang="en-US" dirty="0"/>
+              <a:t>Unsorted Eigen Vectors</a:t>
+            </a:r>
+          </a:p>
+        </p:txBody>
+      </p:sp>
+      <p:sp>
+        <p:nvSpPr>
+          <p:cNvPr id="15" name="TextBox 14"/>
+          <p:cNvSpPr txBox="1"/>
+          <p:nvPr/>
+        </p:nvSpPr>
+        <p:spPr>
+          <a:xfrm>
+            <a:off x="6024961" y="4114800"/>
+            <a:ext cx="2028504" cy="369332"/>
+          </a:xfrm>
+          <a:prstGeom prst="rect">
+            <a:avLst/>
+          </a:prstGeom>
+          <a:noFill/>
+        </p:spPr>
+        <p:txBody>
+          <a:bodyPr wrap="none" rtlCol="0">
+            <a:spAutoFit/>
+          </a:bodyPr>
+          <a:lstStyle/>
+          <a:p>
+            <a:r>
+              <a:rPr lang="en-US" dirty="0"/>
+              <a:t>Sorted Eigen Values</a:t>
+            </a:r>
+          </a:p>
+        </p:txBody>
+      </p:sp>
+      <p:cxnSp>
+        <p:nvCxnSpPr>
+          <p:cNvPr id="17" name="Straight Arrow Connector 16"/>
+          <p:cNvCxnSpPr/>
+          <p:nvPr/>
+        </p:nvCxnSpPr>
+        <p:spPr>
+          <a:xfrm rot="5400000" flipH="1" flipV="1">
+            <a:off x="6057900" y="5143500"/>
+            <a:ext cx="381000" cy="1588"/>
+          </a:xfrm>
+          <a:prstGeom prst="straightConnector1">
+            <a:avLst/>
+          </a:prstGeom>
+          <a:ln>
+            <a:tailEnd type="arrow"/>
+          </a:ln>
+        </p:spPr>
+        <p:style>
+          <a:lnRef idx="1">
+            <a:schemeClr val="accent1"/>
+          </a:lnRef>
+          <a:fillRef idx="0">
+            <a:schemeClr val="accent1"/>
+          </a:fillRef>
+          <a:effectRef idx="0">
+            <a:schemeClr val="accent1"/>
+          </a:effectRef>
+          <a:fontRef idx="minor">
+            <a:schemeClr val="tx1"/>
+          </a:fontRef>
+        </p:style>
+      </p:cxnSp>
+      <p:sp>
+        <p:nvSpPr>
+          <p:cNvPr id="18" name="TextBox 17"/>
+          <p:cNvSpPr txBox="1"/>
+          <p:nvPr/>
+        </p:nvSpPr>
+        <p:spPr>
+          <a:xfrm>
+            <a:off x="5791200" y="5181600"/>
+            <a:ext cx="1248547" cy="369332"/>
+          </a:xfrm>
+          <a:prstGeom prst="rect">
+            <a:avLst/>
+          </a:prstGeom>
+          <a:noFill/>
+        </p:spPr>
+        <p:txBody>
+          <a:bodyPr wrap="none" rtlCol="0">
+            <a:spAutoFit/>
+          </a:bodyPr>
+          <a:lstStyle/>
+          <a:p>
+            <a:r>
+              <a:rPr lang="en-US" dirty="0"/>
+              <a:t>Eigen value</a:t>
+            </a:r>
+          </a:p>
+        </p:txBody>
+      </p:sp>
+      <p:cxnSp>
+        <p:nvCxnSpPr>
+          <p:cNvPr id="20" name="Straight Arrow Connector 19"/>
+          <p:cNvCxnSpPr/>
+          <p:nvPr/>
+        </p:nvCxnSpPr>
+        <p:spPr>
+          <a:xfrm rot="5400000" flipH="1" flipV="1">
+            <a:off x="8497094" y="5142706"/>
+            <a:ext cx="381000" cy="1588"/>
+          </a:xfrm>
+          <a:prstGeom prst="straightConnector1">
+            <a:avLst/>
+          </a:prstGeom>
+          <a:ln>
+            <a:tailEnd type="arrow"/>
+          </a:ln>
+        </p:spPr>
+        <p:style>
+          <a:lnRef idx="1">
+            <a:schemeClr val="accent1"/>
+          </a:lnRef>
+          <a:fillRef idx="0">
+            <a:schemeClr val="accent1"/>
+          </a:fillRef>
+          <a:effectRef idx="0">
+            <a:schemeClr val="accent1"/>
+          </a:effectRef>
+          <a:fontRef idx="minor">
+            <a:schemeClr val="tx1"/>
+          </a:fontRef>
+        </p:style>
+      </p:cxnSp>
+      <p:sp>
+        <p:nvSpPr>
+          <p:cNvPr id="22" name="TextBox 21"/>
+          <p:cNvSpPr txBox="1"/>
+          <p:nvPr/>
+        </p:nvSpPr>
+        <p:spPr>
+          <a:xfrm>
+            <a:off x="8218030" y="5181600"/>
+            <a:ext cx="697370" cy="369332"/>
+          </a:xfrm>
+          <a:prstGeom prst="rect">
+            <a:avLst/>
+          </a:prstGeom>
+          <a:noFill/>
+        </p:spPr>
+        <p:txBody>
+          <a:bodyPr wrap="none" rtlCol="0">
+            <a:spAutoFit/>
+          </a:bodyPr>
+          <a:lstStyle/>
+          <a:p>
+            <a:r>
+              <a:rPr lang="en-US" dirty="0"/>
+              <a:t>Index</a:t>
+            </a:r>
+          </a:p>
+        </p:txBody>
+      </p:sp>
+      <p:sp>
+        <p:nvSpPr>
+          <p:cNvPr id="23" name="TextBox 22"/>
+          <p:cNvSpPr txBox="1"/>
+          <p:nvPr/>
+        </p:nvSpPr>
+        <p:spPr>
+          <a:xfrm>
+            <a:off x="1138297" y="6183868"/>
+            <a:ext cx="2062103" cy="369332"/>
+          </a:xfrm>
+          <a:prstGeom prst="rect">
+            <a:avLst/>
+          </a:prstGeom>
+          <a:noFill/>
+        </p:spPr>
+        <p:txBody>
+          <a:bodyPr wrap="none" rtlCol="0">
+            <a:spAutoFit/>
+          </a:bodyPr>
+          <a:lstStyle/>
+          <a:p>
+            <a:r>
+              <a:rPr lang="en-US" dirty="0"/>
+              <a:t>Sorted </a:t>
+            </a:r>
+            <a:r>
+              <a:rPr lang="en-US" dirty="0" err="1"/>
+              <a:t>EigenVectors</a:t>
+            </a:r>
+            <a:endParaRPr lang="en-US" dirty="0"/>
+          </a:p>
+        </p:txBody>
+      </p:sp>
+    </p:spTree>
+  </p:cSld>
+  <p:clrMapOvr>
+    <a:masterClrMapping/>
+  </p:clrMapOvr>
+</p:sld>
+</file>
+
+<file path=ppt/slides/slide69.xml><?xml version="1.0" encoding="utf-8"?>
 <p:sld xmlns:a="http://schemas.openxmlformats.org/drawingml/2006/main" xmlns:r="http://schemas.openxmlformats.org/officeDocument/2006/relationships" xmlns:p="http://schemas.openxmlformats.org/presentationml/2006/main">
   <p:cSld>
     <p:spTree>

</xml_diff>